<commit_message>
Defense: Initial draft (complete)
</commit_message>
<xml_diff>
--- a/doc/Defense/diagrams.pptx
+++ b/doc/Defense/diagrams.pptx
@@ -9,6 +9,7 @@
     <p:sldId id="257" r:id="rId3"/>
     <p:sldId id="258" r:id="rId4"/>
     <p:sldId id="259" r:id="rId5"/>
+    <p:sldId id="260" r:id="rId6"/>
   </p:sldIdLst>
   <p:sldSz cx="12192000" cy="6858000"/>
   <p:notesSz cx="6858000" cy="9144000"/>
@@ -244,7 +245,7 @@
           <a:p>
             <a:fld id="{3EF6EEE1-EA70-469E-8855-D4E2CB883163}" type="datetimeFigureOut">
               <a:rPr lang="en-US" smtClean="0"/>
-              <a:t>3/3/2017</a:t>
+              <a:t>3/5/2017</a:t>
             </a:fld>
             <a:endParaRPr lang="en-US"/>
           </a:p>
@@ -412,7 +413,7 @@
           <a:p>
             <a:fld id="{3EF6EEE1-EA70-469E-8855-D4E2CB883163}" type="datetimeFigureOut">
               <a:rPr lang="en-US" smtClean="0"/>
-              <a:t>3/3/2017</a:t>
+              <a:t>3/5/2017</a:t>
             </a:fld>
             <a:endParaRPr lang="en-US"/>
           </a:p>
@@ -590,7 +591,7 @@
           <a:p>
             <a:fld id="{3EF6EEE1-EA70-469E-8855-D4E2CB883163}" type="datetimeFigureOut">
               <a:rPr lang="en-US" smtClean="0"/>
-              <a:t>3/3/2017</a:t>
+              <a:t>3/5/2017</a:t>
             </a:fld>
             <a:endParaRPr lang="en-US"/>
           </a:p>
@@ -758,7 +759,7 @@
           <a:p>
             <a:fld id="{3EF6EEE1-EA70-469E-8855-D4E2CB883163}" type="datetimeFigureOut">
               <a:rPr lang="en-US" smtClean="0"/>
-              <a:t>3/3/2017</a:t>
+              <a:t>3/5/2017</a:t>
             </a:fld>
             <a:endParaRPr lang="en-US"/>
           </a:p>
@@ -1003,7 +1004,7 @@
           <a:p>
             <a:fld id="{3EF6EEE1-EA70-469E-8855-D4E2CB883163}" type="datetimeFigureOut">
               <a:rPr lang="en-US" smtClean="0"/>
-              <a:t>3/3/2017</a:t>
+              <a:t>3/5/2017</a:t>
             </a:fld>
             <a:endParaRPr lang="en-US"/>
           </a:p>
@@ -1232,7 +1233,7 @@
           <a:p>
             <a:fld id="{3EF6EEE1-EA70-469E-8855-D4E2CB883163}" type="datetimeFigureOut">
               <a:rPr lang="en-US" smtClean="0"/>
-              <a:t>3/3/2017</a:t>
+              <a:t>3/5/2017</a:t>
             </a:fld>
             <a:endParaRPr lang="en-US"/>
           </a:p>
@@ -1596,7 +1597,7 @@
           <a:p>
             <a:fld id="{3EF6EEE1-EA70-469E-8855-D4E2CB883163}" type="datetimeFigureOut">
               <a:rPr lang="en-US" smtClean="0"/>
-              <a:t>3/3/2017</a:t>
+              <a:t>3/5/2017</a:t>
             </a:fld>
             <a:endParaRPr lang="en-US"/>
           </a:p>
@@ -1713,7 +1714,7 @@
           <a:p>
             <a:fld id="{3EF6EEE1-EA70-469E-8855-D4E2CB883163}" type="datetimeFigureOut">
               <a:rPr lang="en-US" smtClean="0"/>
-              <a:t>3/3/2017</a:t>
+              <a:t>3/5/2017</a:t>
             </a:fld>
             <a:endParaRPr lang="en-US"/>
           </a:p>
@@ -1808,7 +1809,7 @@
           <a:p>
             <a:fld id="{3EF6EEE1-EA70-469E-8855-D4E2CB883163}" type="datetimeFigureOut">
               <a:rPr lang="en-US" smtClean="0"/>
-              <a:t>3/3/2017</a:t>
+              <a:t>3/5/2017</a:t>
             </a:fld>
             <a:endParaRPr lang="en-US"/>
           </a:p>
@@ -2083,7 +2084,7 @@
           <a:p>
             <a:fld id="{3EF6EEE1-EA70-469E-8855-D4E2CB883163}" type="datetimeFigureOut">
               <a:rPr lang="en-US" smtClean="0"/>
-              <a:t>3/3/2017</a:t>
+              <a:t>3/5/2017</a:t>
             </a:fld>
             <a:endParaRPr lang="en-US"/>
           </a:p>
@@ -2335,7 +2336,7 @@
           <a:p>
             <a:fld id="{3EF6EEE1-EA70-469E-8855-D4E2CB883163}" type="datetimeFigureOut">
               <a:rPr lang="en-US" smtClean="0"/>
-              <a:t>3/3/2017</a:t>
+              <a:t>3/5/2017</a:t>
             </a:fld>
             <a:endParaRPr lang="en-US"/>
           </a:p>
@@ -2546,7 +2547,7 @@
           <a:p>
             <a:fld id="{3EF6EEE1-EA70-469E-8855-D4E2CB883163}" type="datetimeFigureOut">
               <a:rPr lang="en-US" smtClean="0"/>
-              <a:t>3/3/2017</a:t>
+              <a:t>3/5/2017</a:t>
             </a:fld>
             <a:endParaRPr lang="en-US"/>
           </a:p>
@@ -6327,6 +6328,88 @@
 </p:sld>
 </file>
 
+<file path=ppt/slides/slide5.xml><?xml version="1.0" encoding="utf-8"?>
+<p:sld xmlns:a="http://schemas.openxmlformats.org/drawingml/2006/main" xmlns:r="http://schemas.openxmlformats.org/officeDocument/2006/relationships" xmlns:p="http://schemas.openxmlformats.org/presentationml/2006/main">
+  <p:cSld>
+    <p:spTree>
+      <p:nvGrpSpPr>
+        <p:cNvPr id="1" name=""/>
+        <p:cNvGrpSpPr/>
+        <p:nvPr/>
+      </p:nvGrpSpPr>
+      <p:grpSpPr>
+        <a:xfrm>
+          <a:off x="0" y="0"/>
+          <a:ext cx="0" cy="0"/>
+          <a:chOff x="0" y="0"/>
+          <a:chExt cx="0" cy="0"/>
+        </a:xfrm>
+      </p:grpSpPr>
+      <p:sp>
+        <p:nvSpPr>
+          <p:cNvPr id="4" name="Rectangle 3"/>
+          <p:cNvSpPr/>
+          <p:nvPr/>
+        </p:nvSpPr>
+        <p:spPr>
+          <a:xfrm>
+            <a:off x="538619" y="1088429"/>
+            <a:ext cx="11555260" cy="1569660"/>
+          </a:xfrm>
+          <a:prstGeom prst="rect">
+            <a:avLst/>
+          </a:prstGeom>
+          <a:noFill/>
+        </p:spPr>
+        <p:txBody>
+          <a:bodyPr wrap="square" lIns="91440" tIns="45720" rIns="91440" bIns="45720">
+            <a:spAutoFit/>
+            <a:scene3d>
+              <a:camera prst="orthographicFront"/>
+              <a:lightRig rig="threePt" dir="t"/>
+            </a:scene3d>
+            <a:sp3d extrusionH="57150">
+              <a:bevelT w="38100" h="38100"/>
+            </a:sp3d>
+          </a:bodyPr>
+          <a:lstStyle/>
+          <a:p>
+            <a:pPr algn="ctr"/>
+            <a:r>
+              <a:rPr lang="en-US" sz="9600" b="1" cap="none" spc="0" dirty="0">
+                <a:ln w="6600">
+                  <a:solidFill>
+                    <a:srgbClr val="500000"/>
+                  </a:solidFill>
+                  <a:prstDash val="solid"/>
+                </a:ln>
+                <a:solidFill>
+                  <a:srgbClr val="500000"/>
+                </a:solidFill>
+                <a:effectLst>
+                  <a:outerShdw blurRad="38100" dist="63500" dir="3600000" algn="tl" rotWithShape="0">
+                    <a:schemeClr val="tx1"/>
+                  </a:outerShdw>
+                </a:effectLst>
+              </a:rPr>
+              <a:t>Thank You &amp; Gig Em</a:t>
+            </a:r>
+          </a:p>
+        </p:txBody>
+      </p:sp>
+    </p:spTree>
+    <p:extLst>
+      <p:ext uri="{BB962C8B-B14F-4D97-AF65-F5344CB8AC3E}">
+        <p14:creationId xmlns:p14="http://schemas.microsoft.com/office/powerpoint/2010/main" val="2537942533"/>
+      </p:ext>
+    </p:extLst>
+  </p:cSld>
+  <p:clrMapOvr>
+    <a:masterClrMapping/>
+  </p:clrMapOvr>
+</p:sld>
+</file>
+
 <file path=ppt/theme/theme1.xml><?xml version="1.0" encoding="utf-8"?>
 <a:theme xmlns:a="http://schemas.openxmlformats.org/drawingml/2006/main" name="Office Theme">
   <a:themeElements>

</xml_diff>

<commit_message>
Defense: Changes after mock presentation
</commit_message>
<xml_diff>
--- a/doc/Defense/diagrams.pptx
+++ b/doc/Defense/diagrams.pptx
@@ -7,9 +7,10 @@
   <p:sldIdLst>
     <p:sldId id="256" r:id="rId2"/>
     <p:sldId id="257" r:id="rId3"/>
-    <p:sldId id="258" r:id="rId4"/>
-    <p:sldId id="259" r:id="rId5"/>
-    <p:sldId id="260" r:id="rId6"/>
+    <p:sldId id="261" r:id="rId4"/>
+    <p:sldId id="258" r:id="rId5"/>
+    <p:sldId id="259" r:id="rId6"/>
+    <p:sldId id="260" r:id="rId7"/>
   </p:sldIdLst>
   <p:sldSz cx="12192000" cy="6858000"/>
   <p:notesSz cx="6858000" cy="9144000"/>
@@ -245,7 +246,7 @@
           <a:p>
             <a:fld id="{3EF6EEE1-EA70-469E-8855-D4E2CB883163}" type="datetimeFigureOut">
               <a:rPr lang="en-US" smtClean="0"/>
-              <a:t>3/5/2017</a:t>
+              <a:t>3/6/2017</a:t>
             </a:fld>
             <a:endParaRPr lang="en-US"/>
           </a:p>
@@ -413,7 +414,7 @@
           <a:p>
             <a:fld id="{3EF6EEE1-EA70-469E-8855-D4E2CB883163}" type="datetimeFigureOut">
               <a:rPr lang="en-US" smtClean="0"/>
-              <a:t>3/5/2017</a:t>
+              <a:t>3/6/2017</a:t>
             </a:fld>
             <a:endParaRPr lang="en-US"/>
           </a:p>
@@ -591,7 +592,7 @@
           <a:p>
             <a:fld id="{3EF6EEE1-EA70-469E-8855-D4E2CB883163}" type="datetimeFigureOut">
               <a:rPr lang="en-US" smtClean="0"/>
-              <a:t>3/5/2017</a:t>
+              <a:t>3/6/2017</a:t>
             </a:fld>
             <a:endParaRPr lang="en-US"/>
           </a:p>
@@ -759,7 +760,7 @@
           <a:p>
             <a:fld id="{3EF6EEE1-EA70-469E-8855-D4E2CB883163}" type="datetimeFigureOut">
               <a:rPr lang="en-US" smtClean="0"/>
-              <a:t>3/5/2017</a:t>
+              <a:t>3/6/2017</a:t>
             </a:fld>
             <a:endParaRPr lang="en-US"/>
           </a:p>
@@ -1004,7 +1005,7 @@
           <a:p>
             <a:fld id="{3EF6EEE1-EA70-469E-8855-D4E2CB883163}" type="datetimeFigureOut">
               <a:rPr lang="en-US" smtClean="0"/>
-              <a:t>3/5/2017</a:t>
+              <a:t>3/6/2017</a:t>
             </a:fld>
             <a:endParaRPr lang="en-US"/>
           </a:p>
@@ -1233,7 +1234,7 @@
           <a:p>
             <a:fld id="{3EF6EEE1-EA70-469E-8855-D4E2CB883163}" type="datetimeFigureOut">
               <a:rPr lang="en-US" smtClean="0"/>
-              <a:t>3/5/2017</a:t>
+              <a:t>3/6/2017</a:t>
             </a:fld>
             <a:endParaRPr lang="en-US"/>
           </a:p>
@@ -1597,7 +1598,7 @@
           <a:p>
             <a:fld id="{3EF6EEE1-EA70-469E-8855-D4E2CB883163}" type="datetimeFigureOut">
               <a:rPr lang="en-US" smtClean="0"/>
-              <a:t>3/5/2017</a:t>
+              <a:t>3/6/2017</a:t>
             </a:fld>
             <a:endParaRPr lang="en-US"/>
           </a:p>
@@ -1714,7 +1715,7 @@
           <a:p>
             <a:fld id="{3EF6EEE1-EA70-469E-8855-D4E2CB883163}" type="datetimeFigureOut">
               <a:rPr lang="en-US" smtClean="0"/>
-              <a:t>3/5/2017</a:t>
+              <a:t>3/6/2017</a:t>
             </a:fld>
             <a:endParaRPr lang="en-US"/>
           </a:p>
@@ -1809,7 +1810,7 @@
           <a:p>
             <a:fld id="{3EF6EEE1-EA70-469E-8855-D4E2CB883163}" type="datetimeFigureOut">
               <a:rPr lang="en-US" smtClean="0"/>
-              <a:t>3/5/2017</a:t>
+              <a:t>3/6/2017</a:t>
             </a:fld>
             <a:endParaRPr lang="en-US"/>
           </a:p>
@@ -2084,7 +2085,7 @@
           <a:p>
             <a:fld id="{3EF6EEE1-EA70-469E-8855-D4E2CB883163}" type="datetimeFigureOut">
               <a:rPr lang="en-US" smtClean="0"/>
-              <a:t>3/5/2017</a:t>
+              <a:t>3/6/2017</a:t>
             </a:fld>
             <a:endParaRPr lang="en-US"/>
           </a:p>
@@ -2336,7 +2337,7 @@
           <a:p>
             <a:fld id="{3EF6EEE1-EA70-469E-8855-D4E2CB883163}" type="datetimeFigureOut">
               <a:rPr lang="en-US" smtClean="0"/>
-              <a:t>3/5/2017</a:t>
+              <a:t>3/6/2017</a:t>
             </a:fld>
             <a:endParaRPr lang="en-US"/>
           </a:p>
@@ -2547,7 +2548,7 @@
           <a:p>
             <a:fld id="{3EF6EEE1-EA70-469E-8855-D4E2CB883163}" type="datetimeFigureOut">
               <a:rPr lang="en-US" smtClean="0"/>
-              <a:t>3/5/2017</a:t>
+              <a:t>3/6/2017</a:t>
             </a:fld>
             <a:endParaRPr lang="en-US"/>
           </a:p>
@@ -4755,6 +4756,3216 @@
       </p:grpSpPr>
       <p:grpSp>
         <p:nvGrpSpPr>
+          <p:cNvPr id="67" name="Group 66"/>
+          <p:cNvGrpSpPr/>
+          <p:nvPr/>
+        </p:nvGrpSpPr>
+        <p:grpSpPr>
+          <a:xfrm>
+            <a:off x="813692" y="1511001"/>
+            <a:ext cx="10723687" cy="4237917"/>
+            <a:chOff x="864492" y="1872951"/>
+            <a:chExt cx="10723687" cy="4237917"/>
+          </a:xfrm>
+        </p:grpSpPr>
+        <p:cxnSp>
+          <p:nvCxnSpPr>
+            <p:cNvPr id="5" name="Straight Arrow Connector 4"/>
+            <p:cNvCxnSpPr>
+              <a:cxnSpLocks/>
+            </p:cNvCxnSpPr>
+            <p:nvPr/>
+          </p:nvCxnSpPr>
+          <p:spPr>
+            <a:xfrm>
+              <a:off x="1139869" y="4236781"/>
+              <a:ext cx="9832932" cy="0"/>
+            </a:xfrm>
+            <a:prstGeom prst="straightConnector1">
+              <a:avLst/>
+            </a:prstGeom>
+            <a:ln w="38100">
+              <a:headEnd type="triangle"/>
+              <a:tailEnd type="triangle"/>
+            </a:ln>
+          </p:spPr>
+          <p:style>
+            <a:lnRef idx="1">
+              <a:schemeClr val="dk1"/>
+            </a:lnRef>
+            <a:fillRef idx="0">
+              <a:schemeClr val="dk1"/>
+            </a:fillRef>
+            <a:effectRef idx="0">
+              <a:schemeClr val="dk1"/>
+            </a:effectRef>
+            <a:fontRef idx="minor">
+              <a:schemeClr val="tx1"/>
+            </a:fontRef>
+          </p:style>
+        </p:cxnSp>
+        <p:cxnSp>
+          <p:nvCxnSpPr>
+            <p:cNvPr id="7" name="Straight Connector 6"/>
+            <p:cNvCxnSpPr/>
+            <p:nvPr/>
+          </p:nvCxnSpPr>
+          <p:spPr>
+            <a:xfrm>
+              <a:off x="2074128" y="4053901"/>
+              <a:ext cx="0" cy="365760"/>
+            </a:xfrm>
+            <a:prstGeom prst="line">
+              <a:avLst/>
+            </a:prstGeom>
+            <a:ln w="38100"/>
+          </p:spPr>
+          <p:style>
+            <a:lnRef idx="1">
+              <a:schemeClr val="dk1"/>
+            </a:lnRef>
+            <a:fillRef idx="0">
+              <a:schemeClr val="dk1"/>
+            </a:fillRef>
+            <a:effectRef idx="0">
+              <a:schemeClr val="dk1"/>
+            </a:effectRef>
+            <a:fontRef idx="minor">
+              <a:schemeClr val="tx1"/>
+            </a:fontRef>
+          </p:style>
+        </p:cxnSp>
+        <p:cxnSp>
+          <p:nvCxnSpPr>
+            <p:cNvPr id="8" name="Straight Connector 7"/>
+            <p:cNvCxnSpPr/>
+            <p:nvPr/>
+          </p:nvCxnSpPr>
+          <p:spPr>
+            <a:xfrm>
+              <a:off x="10047250" y="4053901"/>
+              <a:ext cx="0" cy="365760"/>
+            </a:xfrm>
+            <a:prstGeom prst="line">
+              <a:avLst/>
+            </a:prstGeom>
+            <a:ln w="38100"/>
+          </p:spPr>
+          <p:style>
+            <a:lnRef idx="1">
+              <a:schemeClr val="dk1"/>
+            </a:lnRef>
+            <a:fillRef idx="0">
+              <a:schemeClr val="dk1"/>
+            </a:fillRef>
+            <a:effectRef idx="0">
+              <a:schemeClr val="dk1"/>
+            </a:effectRef>
+            <a:fontRef idx="minor">
+              <a:schemeClr val="tx1"/>
+            </a:fontRef>
+          </p:style>
+        </p:cxnSp>
+        <p:cxnSp>
+          <p:nvCxnSpPr>
+            <p:cNvPr id="9" name="Straight Connector 8"/>
+            <p:cNvCxnSpPr/>
+            <p:nvPr/>
+          </p:nvCxnSpPr>
+          <p:spPr>
+            <a:xfrm>
+              <a:off x="2877790" y="4145341"/>
+              <a:ext cx="0" cy="182880"/>
+            </a:xfrm>
+            <a:prstGeom prst="line">
+              <a:avLst/>
+            </a:prstGeom>
+            <a:ln w="38100"/>
+          </p:spPr>
+          <p:style>
+            <a:lnRef idx="1">
+              <a:schemeClr val="dk1"/>
+            </a:lnRef>
+            <a:fillRef idx="0">
+              <a:schemeClr val="dk1"/>
+            </a:fillRef>
+            <a:effectRef idx="0">
+              <a:schemeClr val="dk1"/>
+            </a:effectRef>
+            <a:fontRef idx="minor">
+              <a:schemeClr val="tx1"/>
+            </a:fontRef>
+          </p:style>
+        </p:cxnSp>
+        <p:cxnSp>
+          <p:nvCxnSpPr>
+            <p:cNvPr id="10" name="Straight Connector 9"/>
+            <p:cNvCxnSpPr>
+              <a:cxnSpLocks/>
+            </p:cNvCxnSpPr>
+            <p:nvPr/>
+          </p:nvCxnSpPr>
+          <p:spPr>
+            <a:xfrm>
+              <a:off x="3672985" y="4145341"/>
+              <a:ext cx="0" cy="182880"/>
+            </a:xfrm>
+            <a:prstGeom prst="line">
+              <a:avLst/>
+            </a:prstGeom>
+            <a:ln w="38100"/>
+          </p:spPr>
+          <p:style>
+            <a:lnRef idx="1">
+              <a:schemeClr val="dk1"/>
+            </a:lnRef>
+            <a:fillRef idx="0">
+              <a:schemeClr val="dk1"/>
+            </a:fillRef>
+            <a:effectRef idx="0">
+              <a:schemeClr val="dk1"/>
+            </a:effectRef>
+            <a:fontRef idx="minor">
+              <a:schemeClr val="tx1"/>
+            </a:fontRef>
+          </p:style>
+        </p:cxnSp>
+        <p:cxnSp>
+          <p:nvCxnSpPr>
+            <p:cNvPr id="14" name="Straight Connector 13"/>
+            <p:cNvCxnSpPr>
+              <a:cxnSpLocks/>
+            </p:cNvCxnSpPr>
+            <p:nvPr/>
+          </p:nvCxnSpPr>
+          <p:spPr>
+            <a:xfrm>
+              <a:off x="4468852" y="4145341"/>
+              <a:ext cx="0" cy="182880"/>
+            </a:xfrm>
+            <a:prstGeom prst="line">
+              <a:avLst/>
+            </a:prstGeom>
+            <a:ln w="38100"/>
+          </p:spPr>
+          <p:style>
+            <a:lnRef idx="1">
+              <a:schemeClr val="dk1"/>
+            </a:lnRef>
+            <a:fillRef idx="0">
+              <a:schemeClr val="dk1"/>
+            </a:fillRef>
+            <a:effectRef idx="0">
+              <a:schemeClr val="dk1"/>
+            </a:effectRef>
+            <a:fontRef idx="minor">
+              <a:schemeClr val="tx1"/>
+            </a:fontRef>
+          </p:style>
+        </p:cxnSp>
+        <p:cxnSp>
+          <p:nvCxnSpPr>
+            <p:cNvPr id="19" name="Straight Connector 18"/>
+            <p:cNvCxnSpPr>
+              <a:cxnSpLocks/>
+            </p:cNvCxnSpPr>
+            <p:nvPr/>
+          </p:nvCxnSpPr>
+          <p:spPr>
+            <a:xfrm>
+              <a:off x="5260468" y="4145341"/>
+              <a:ext cx="0" cy="182880"/>
+            </a:xfrm>
+            <a:prstGeom prst="line">
+              <a:avLst/>
+            </a:prstGeom>
+            <a:ln w="38100"/>
+          </p:spPr>
+          <p:style>
+            <a:lnRef idx="1">
+              <a:schemeClr val="dk1"/>
+            </a:lnRef>
+            <a:fillRef idx="0">
+              <a:schemeClr val="dk1"/>
+            </a:fillRef>
+            <a:effectRef idx="0">
+              <a:schemeClr val="dk1"/>
+            </a:effectRef>
+            <a:fontRef idx="minor">
+              <a:schemeClr val="tx1"/>
+            </a:fontRef>
+          </p:style>
+        </p:cxnSp>
+        <p:cxnSp>
+          <p:nvCxnSpPr>
+            <p:cNvPr id="20" name="Straight Connector 19"/>
+            <p:cNvCxnSpPr>
+              <a:cxnSpLocks/>
+            </p:cNvCxnSpPr>
+            <p:nvPr/>
+          </p:nvCxnSpPr>
+          <p:spPr>
+            <a:xfrm>
+              <a:off x="6056335" y="4145341"/>
+              <a:ext cx="0" cy="182880"/>
+            </a:xfrm>
+            <a:prstGeom prst="line">
+              <a:avLst/>
+            </a:prstGeom>
+            <a:ln w="38100"/>
+          </p:spPr>
+          <p:style>
+            <a:lnRef idx="1">
+              <a:schemeClr val="dk1"/>
+            </a:lnRef>
+            <a:fillRef idx="0">
+              <a:schemeClr val="dk1"/>
+            </a:fillRef>
+            <a:effectRef idx="0">
+              <a:schemeClr val="dk1"/>
+            </a:effectRef>
+            <a:fontRef idx="minor">
+              <a:schemeClr val="tx1"/>
+            </a:fontRef>
+          </p:style>
+        </p:cxnSp>
+        <p:cxnSp>
+          <p:nvCxnSpPr>
+            <p:cNvPr id="21" name="Straight Connector 20"/>
+            <p:cNvCxnSpPr>
+              <a:cxnSpLocks/>
+            </p:cNvCxnSpPr>
+            <p:nvPr/>
+          </p:nvCxnSpPr>
+          <p:spPr>
+            <a:xfrm>
+              <a:off x="6864918" y="4145341"/>
+              <a:ext cx="0" cy="182880"/>
+            </a:xfrm>
+            <a:prstGeom prst="line">
+              <a:avLst/>
+            </a:prstGeom>
+            <a:ln w="38100"/>
+          </p:spPr>
+          <p:style>
+            <a:lnRef idx="1">
+              <a:schemeClr val="dk1"/>
+            </a:lnRef>
+            <a:fillRef idx="0">
+              <a:schemeClr val="dk1"/>
+            </a:fillRef>
+            <a:effectRef idx="0">
+              <a:schemeClr val="dk1"/>
+            </a:effectRef>
+            <a:fontRef idx="minor">
+              <a:schemeClr val="tx1"/>
+            </a:fontRef>
+          </p:style>
+        </p:cxnSp>
+        <p:cxnSp>
+          <p:nvCxnSpPr>
+            <p:cNvPr id="22" name="Straight Connector 21"/>
+            <p:cNvCxnSpPr>
+              <a:cxnSpLocks/>
+            </p:cNvCxnSpPr>
+            <p:nvPr/>
+          </p:nvCxnSpPr>
+          <p:spPr>
+            <a:xfrm>
+              <a:off x="7660785" y="4145341"/>
+              <a:ext cx="0" cy="182880"/>
+            </a:xfrm>
+            <a:prstGeom prst="line">
+              <a:avLst/>
+            </a:prstGeom>
+            <a:ln w="38100"/>
+          </p:spPr>
+          <p:style>
+            <a:lnRef idx="1">
+              <a:schemeClr val="dk1"/>
+            </a:lnRef>
+            <a:fillRef idx="0">
+              <a:schemeClr val="dk1"/>
+            </a:fillRef>
+            <a:effectRef idx="0">
+              <a:schemeClr val="dk1"/>
+            </a:effectRef>
+            <a:fontRef idx="minor">
+              <a:schemeClr val="tx1"/>
+            </a:fontRef>
+          </p:style>
+        </p:cxnSp>
+        <p:cxnSp>
+          <p:nvCxnSpPr>
+            <p:cNvPr id="23" name="Straight Connector 22"/>
+            <p:cNvCxnSpPr>
+              <a:cxnSpLocks/>
+            </p:cNvCxnSpPr>
+            <p:nvPr/>
+          </p:nvCxnSpPr>
+          <p:spPr>
+            <a:xfrm>
+              <a:off x="8452401" y="4145341"/>
+              <a:ext cx="0" cy="182880"/>
+            </a:xfrm>
+            <a:prstGeom prst="line">
+              <a:avLst/>
+            </a:prstGeom>
+            <a:ln w="38100"/>
+          </p:spPr>
+          <p:style>
+            <a:lnRef idx="1">
+              <a:schemeClr val="dk1"/>
+            </a:lnRef>
+            <a:fillRef idx="0">
+              <a:schemeClr val="dk1"/>
+            </a:fillRef>
+            <a:effectRef idx="0">
+              <a:schemeClr val="dk1"/>
+            </a:effectRef>
+            <a:fontRef idx="minor">
+              <a:schemeClr val="tx1"/>
+            </a:fontRef>
+          </p:style>
+        </p:cxnSp>
+        <p:cxnSp>
+          <p:nvCxnSpPr>
+            <p:cNvPr id="24" name="Straight Connector 23"/>
+            <p:cNvCxnSpPr>
+              <a:cxnSpLocks/>
+            </p:cNvCxnSpPr>
+            <p:nvPr/>
+          </p:nvCxnSpPr>
+          <p:spPr>
+            <a:xfrm>
+              <a:off x="9248268" y="4145341"/>
+              <a:ext cx="0" cy="182880"/>
+            </a:xfrm>
+            <a:prstGeom prst="line">
+              <a:avLst/>
+            </a:prstGeom>
+            <a:ln w="38100"/>
+          </p:spPr>
+          <p:style>
+            <a:lnRef idx="1">
+              <a:schemeClr val="dk1"/>
+            </a:lnRef>
+            <a:fillRef idx="0">
+              <a:schemeClr val="dk1"/>
+            </a:fillRef>
+            <a:effectRef idx="0">
+              <a:schemeClr val="dk1"/>
+            </a:effectRef>
+            <a:fontRef idx="minor">
+              <a:schemeClr val="tx1"/>
+            </a:fontRef>
+          </p:style>
+        </p:cxnSp>
+        <p:sp>
+          <p:nvSpPr>
+            <p:cNvPr id="26" name="Arrow: Curved Down 25"/>
+            <p:cNvSpPr/>
+            <p:nvPr/>
+          </p:nvSpPr>
+          <p:spPr>
+            <a:xfrm flipV="1">
+              <a:off x="2035098" y="4856356"/>
+              <a:ext cx="8346688" cy="1254512"/>
+            </a:xfrm>
+            <a:prstGeom prst="curvedDownArrow">
+              <a:avLst>
+                <a:gd name="adj1" fmla="val 4875"/>
+                <a:gd name="adj2" fmla="val 50000"/>
+                <a:gd name="adj3" fmla="val 25000"/>
+              </a:avLst>
+            </a:prstGeom>
+            <a:solidFill>
+              <a:srgbClr val="0070C0"/>
+            </a:solidFill>
+            <a:ln w="76200">
+              <a:solidFill>
+                <a:srgbClr val="0070C0"/>
+              </a:solidFill>
+            </a:ln>
+          </p:spPr>
+          <p:style>
+            <a:lnRef idx="2">
+              <a:schemeClr val="accent1">
+                <a:shade val="50000"/>
+              </a:schemeClr>
+            </a:lnRef>
+            <a:fillRef idx="1">
+              <a:schemeClr val="accent1"/>
+            </a:fillRef>
+            <a:effectRef idx="0">
+              <a:schemeClr val="accent1"/>
+            </a:effectRef>
+            <a:fontRef idx="minor">
+              <a:schemeClr val="lt1"/>
+            </a:fontRef>
+          </p:style>
+          <p:txBody>
+            <a:bodyPr rtlCol="0" anchor="ctr"/>
+            <a:lstStyle/>
+            <a:p>
+              <a:pPr algn="ctr"/>
+              <a:endParaRPr lang="en-US">
+                <a:solidFill>
+                  <a:schemeClr val="tx1"/>
+                </a:solidFill>
+              </a:endParaRPr>
+            </a:p>
+          </p:txBody>
+        </p:sp>
+        <p:sp>
+          <p:nvSpPr>
+            <p:cNvPr id="27" name="Arrow: Curved Down 26"/>
+            <p:cNvSpPr/>
+            <p:nvPr/>
+          </p:nvSpPr>
+          <p:spPr>
+            <a:xfrm flipV="1">
+              <a:off x="2074128" y="4511100"/>
+              <a:ext cx="803662" cy="253816"/>
+            </a:xfrm>
+            <a:prstGeom prst="curvedDownArrow">
+              <a:avLst>
+                <a:gd name="adj1" fmla="val 0"/>
+                <a:gd name="adj2" fmla="val 32007"/>
+                <a:gd name="adj3" fmla="val 31460"/>
+              </a:avLst>
+            </a:prstGeom>
+            <a:solidFill>
+              <a:srgbClr val="FF0000"/>
+            </a:solidFill>
+            <a:ln w="28575">
+              <a:solidFill>
+                <a:srgbClr val="FF0000"/>
+              </a:solidFill>
+            </a:ln>
+          </p:spPr>
+          <p:style>
+            <a:lnRef idx="2">
+              <a:schemeClr val="accent1">
+                <a:shade val="50000"/>
+              </a:schemeClr>
+            </a:lnRef>
+            <a:fillRef idx="1">
+              <a:schemeClr val="accent1"/>
+            </a:fillRef>
+            <a:effectRef idx="0">
+              <a:schemeClr val="accent1"/>
+            </a:effectRef>
+            <a:fontRef idx="minor">
+              <a:schemeClr val="lt1"/>
+            </a:fontRef>
+          </p:style>
+          <p:txBody>
+            <a:bodyPr rtlCol="0" anchor="ctr"/>
+            <a:lstStyle/>
+            <a:p>
+              <a:pPr algn="ctr"/>
+              <a:endParaRPr lang="en-US">
+                <a:solidFill>
+                  <a:schemeClr val="tx1"/>
+                </a:solidFill>
+              </a:endParaRPr>
+            </a:p>
+          </p:txBody>
+        </p:sp>
+        <p:sp>
+          <p:nvSpPr>
+            <p:cNvPr id="30" name="Arrow: Curved Down 29"/>
+            <p:cNvSpPr/>
+            <p:nvPr/>
+          </p:nvSpPr>
+          <p:spPr>
+            <a:xfrm flipV="1">
+              <a:off x="2877790" y="4546569"/>
+              <a:ext cx="803662" cy="253816"/>
+            </a:xfrm>
+            <a:prstGeom prst="curvedDownArrow">
+              <a:avLst>
+                <a:gd name="adj1" fmla="val 0"/>
+                <a:gd name="adj2" fmla="val 32007"/>
+                <a:gd name="adj3" fmla="val 31460"/>
+              </a:avLst>
+            </a:prstGeom>
+            <a:solidFill>
+              <a:srgbClr val="FF0000"/>
+            </a:solidFill>
+            <a:ln w="28575">
+              <a:solidFill>
+                <a:srgbClr val="FF0000"/>
+              </a:solidFill>
+            </a:ln>
+          </p:spPr>
+          <p:style>
+            <a:lnRef idx="2">
+              <a:schemeClr val="accent1">
+                <a:shade val="50000"/>
+              </a:schemeClr>
+            </a:lnRef>
+            <a:fillRef idx="1">
+              <a:schemeClr val="accent1"/>
+            </a:fillRef>
+            <a:effectRef idx="0">
+              <a:schemeClr val="accent1"/>
+            </a:effectRef>
+            <a:fontRef idx="minor">
+              <a:schemeClr val="lt1"/>
+            </a:fontRef>
+          </p:style>
+          <p:txBody>
+            <a:bodyPr rtlCol="0" anchor="ctr"/>
+            <a:lstStyle/>
+            <a:p>
+              <a:pPr algn="ctr"/>
+              <a:endParaRPr lang="en-US">
+                <a:solidFill>
+                  <a:schemeClr val="tx1"/>
+                </a:solidFill>
+              </a:endParaRPr>
+            </a:p>
+          </p:txBody>
+        </p:sp>
+        <p:sp>
+          <p:nvSpPr>
+            <p:cNvPr id="31" name="Arrow: Curved Down 30"/>
+            <p:cNvSpPr/>
+            <p:nvPr/>
+          </p:nvSpPr>
+          <p:spPr>
+            <a:xfrm flipV="1">
+              <a:off x="3681452" y="4556820"/>
+              <a:ext cx="803662" cy="253816"/>
+            </a:xfrm>
+            <a:prstGeom prst="curvedDownArrow">
+              <a:avLst>
+                <a:gd name="adj1" fmla="val 0"/>
+                <a:gd name="adj2" fmla="val 32007"/>
+                <a:gd name="adj3" fmla="val 31460"/>
+              </a:avLst>
+            </a:prstGeom>
+            <a:solidFill>
+              <a:srgbClr val="FF0000"/>
+            </a:solidFill>
+            <a:ln w="28575">
+              <a:solidFill>
+                <a:srgbClr val="FF0000"/>
+              </a:solidFill>
+            </a:ln>
+          </p:spPr>
+          <p:style>
+            <a:lnRef idx="2">
+              <a:schemeClr val="accent1">
+                <a:shade val="50000"/>
+              </a:schemeClr>
+            </a:lnRef>
+            <a:fillRef idx="1">
+              <a:schemeClr val="accent1"/>
+            </a:fillRef>
+            <a:effectRef idx="0">
+              <a:schemeClr val="accent1"/>
+            </a:effectRef>
+            <a:fontRef idx="minor">
+              <a:schemeClr val="lt1"/>
+            </a:fontRef>
+          </p:style>
+          <p:txBody>
+            <a:bodyPr rtlCol="0" anchor="ctr"/>
+            <a:lstStyle/>
+            <a:p>
+              <a:pPr algn="ctr"/>
+              <a:endParaRPr lang="en-US">
+                <a:solidFill>
+                  <a:schemeClr val="tx1"/>
+                </a:solidFill>
+              </a:endParaRPr>
+            </a:p>
+          </p:txBody>
+        </p:sp>
+        <p:sp>
+          <p:nvSpPr>
+            <p:cNvPr id="32" name="Arrow: Curved Down 31"/>
+            <p:cNvSpPr/>
+            <p:nvPr/>
+          </p:nvSpPr>
+          <p:spPr>
+            <a:xfrm flipV="1">
+              <a:off x="4485114" y="4551930"/>
+              <a:ext cx="803662" cy="253816"/>
+            </a:xfrm>
+            <a:prstGeom prst="curvedDownArrow">
+              <a:avLst>
+                <a:gd name="adj1" fmla="val 0"/>
+                <a:gd name="adj2" fmla="val 32007"/>
+                <a:gd name="adj3" fmla="val 31460"/>
+              </a:avLst>
+            </a:prstGeom>
+            <a:solidFill>
+              <a:srgbClr val="FF0000"/>
+            </a:solidFill>
+            <a:ln w="28575">
+              <a:solidFill>
+                <a:srgbClr val="FF0000"/>
+              </a:solidFill>
+            </a:ln>
+          </p:spPr>
+          <p:style>
+            <a:lnRef idx="2">
+              <a:schemeClr val="accent1">
+                <a:shade val="50000"/>
+              </a:schemeClr>
+            </a:lnRef>
+            <a:fillRef idx="1">
+              <a:schemeClr val="accent1"/>
+            </a:fillRef>
+            <a:effectRef idx="0">
+              <a:schemeClr val="accent1"/>
+            </a:effectRef>
+            <a:fontRef idx="minor">
+              <a:schemeClr val="lt1"/>
+            </a:fontRef>
+          </p:style>
+          <p:txBody>
+            <a:bodyPr rtlCol="0" anchor="ctr"/>
+            <a:lstStyle/>
+            <a:p>
+              <a:pPr algn="ctr"/>
+              <a:endParaRPr lang="en-US">
+                <a:solidFill>
+                  <a:schemeClr val="tx1"/>
+                </a:solidFill>
+              </a:endParaRPr>
+            </a:p>
+          </p:txBody>
+        </p:sp>
+        <p:sp>
+          <p:nvSpPr>
+            <p:cNvPr id="33" name="Arrow: Curved Down 32"/>
+            <p:cNvSpPr/>
+            <p:nvPr/>
+          </p:nvSpPr>
+          <p:spPr>
+            <a:xfrm flipV="1">
+              <a:off x="5288776" y="4562181"/>
+              <a:ext cx="803662" cy="253816"/>
+            </a:xfrm>
+            <a:prstGeom prst="curvedDownArrow">
+              <a:avLst>
+                <a:gd name="adj1" fmla="val 0"/>
+                <a:gd name="adj2" fmla="val 32007"/>
+                <a:gd name="adj3" fmla="val 31460"/>
+              </a:avLst>
+            </a:prstGeom>
+            <a:solidFill>
+              <a:srgbClr val="FF0000"/>
+            </a:solidFill>
+            <a:ln w="28575">
+              <a:solidFill>
+                <a:srgbClr val="FF0000"/>
+              </a:solidFill>
+            </a:ln>
+          </p:spPr>
+          <p:style>
+            <a:lnRef idx="2">
+              <a:schemeClr val="accent1">
+                <a:shade val="50000"/>
+              </a:schemeClr>
+            </a:lnRef>
+            <a:fillRef idx="1">
+              <a:schemeClr val="accent1"/>
+            </a:fillRef>
+            <a:effectRef idx="0">
+              <a:schemeClr val="accent1"/>
+            </a:effectRef>
+            <a:fontRef idx="minor">
+              <a:schemeClr val="lt1"/>
+            </a:fontRef>
+          </p:style>
+          <p:txBody>
+            <a:bodyPr rtlCol="0" anchor="ctr"/>
+            <a:lstStyle/>
+            <a:p>
+              <a:pPr algn="ctr"/>
+              <a:endParaRPr lang="en-US">
+                <a:solidFill>
+                  <a:schemeClr val="tx1"/>
+                </a:solidFill>
+              </a:endParaRPr>
+            </a:p>
+          </p:txBody>
+        </p:sp>
+        <p:sp>
+          <p:nvSpPr>
+            <p:cNvPr id="34" name="Arrow: Curved Down 33"/>
+            <p:cNvSpPr/>
+            <p:nvPr/>
+          </p:nvSpPr>
+          <p:spPr>
+            <a:xfrm flipV="1">
+              <a:off x="6092438" y="4564304"/>
+              <a:ext cx="803662" cy="253816"/>
+            </a:xfrm>
+            <a:prstGeom prst="curvedDownArrow">
+              <a:avLst>
+                <a:gd name="adj1" fmla="val 0"/>
+                <a:gd name="adj2" fmla="val 32007"/>
+                <a:gd name="adj3" fmla="val 31460"/>
+              </a:avLst>
+            </a:prstGeom>
+            <a:solidFill>
+              <a:srgbClr val="FF0000"/>
+            </a:solidFill>
+            <a:ln w="28575">
+              <a:solidFill>
+                <a:srgbClr val="FF0000"/>
+              </a:solidFill>
+            </a:ln>
+          </p:spPr>
+          <p:style>
+            <a:lnRef idx="2">
+              <a:schemeClr val="accent1">
+                <a:shade val="50000"/>
+              </a:schemeClr>
+            </a:lnRef>
+            <a:fillRef idx="1">
+              <a:schemeClr val="accent1"/>
+            </a:fillRef>
+            <a:effectRef idx="0">
+              <a:schemeClr val="accent1"/>
+            </a:effectRef>
+            <a:fontRef idx="minor">
+              <a:schemeClr val="lt1"/>
+            </a:fontRef>
+          </p:style>
+          <p:txBody>
+            <a:bodyPr rtlCol="0" anchor="ctr"/>
+            <a:lstStyle/>
+            <a:p>
+              <a:pPr algn="ctr"/>
+              <a:endParaRPr lang="en-US">
+                <a:solidFill>
+                  <a:schemeClr val="tx1"/>
+                </a:solidFill>
+              </a:endParaRPr>
+            </a:p>
+          </p:txBody>
+        </p:sp>
+        <p:sp>
+          <p:nvSpPr>
+            <p:cNvPr id="35" name="Arrow: Curved Down 34"/>
+            <p:cNvSpPr/>
+            <p:nvPr/>
+          </p:nvSpPr>
+          <p:spPr>
+            <a:xfrm flipV="1">
+              <a:off x="6896100" y="4574555"/>
+              <a:ext cx="803662" cy="253816"/>
+            </a:xfrm>
+            <a:prstGeom prst="curvedDownArrow">
+              <a:avLst>
+                <a:gd name="adj1" fmla="val 0"/>
+                <a:gd name="adj2" fmla="val 32007"/>
+                <a:gd name="adj3" fmla="val 31460"/>
+              </a:avLst>
+            </a:prstGeom>
+            <a:solidFill>
+              <a:srgbClr val="FF0000"/>
+            </a:solidFill>
+            <a:ln w="28575">
+              <a:solidFill>
+                <a:srgbClr val="FF0000"/>
+              </a:solidFill>
+            </a:ln>
+          </p:spPr>
+          <p:style>
+            <a:lnRef idx="2">
+              <a:schemeClr val="accent1">
+                <a:shade val="50000"/>
+              </a:schemeClr>
+            </a:lnRef>
+            <a:fillRef idx="1">
+              <a:schemeClr val="accent1"/>
+            </a:fillRef>
+            <a:effectRef idx="0">
+              <a:schemeClr val="accent1"/>
+            </a:effectRef>
+            <a:fontRef idx="minor">
+              <a:schemeClr val="lt1"/>
+            </a:fontRef>
+          </p:style>
+          <p:txBody>
+            <a:bodyPr rtlCol="0" anchor="ctr"/>
+            <a:lstStyle/>
+            <a:p>
+              <a:pPr algn="ctr"/>
+              <a:endParaRPr lang="en-US">
+                <a:solidFill>
+                  <a:schemeClr val="tx1"/>
+                </a:solidFill>
+              </a:endParaRPr>
+            </a:p>
+          </p:txBody>
+        </p:sp>
+        <p:sp>
+          <p:nvSpPr>
+            <p:cNvPr id="36" name="Arrow: Curved Down 35"/>
+            <p:cNvSpPr/>
+            <p:nvPr/>
+          </p:nvSpPr>
+          <p:spPr>
+            <a:xfrm flipV="1">
+              <a:off x="7699762" y="4569665"/>
+              <a:ext cx="803662" cy="253816"/>
+            </a:xfrm>
+            <a:prstGeom prst="curvedDownArrow">
+              <a:avLst>
+                <a:gd name="adj1" fmla="val 0"/>
+                <a:gd name="adj2" fmla="val 32007"/>
+                <a:gd name="adj3" fmla="val 31460"/>
+              </a:avLst>
+            </a:prstGeom>
+            <a:solidFill>
+              <a:srgbClr val="FF0000"/>
+            </a:solidFill>
+            <a:ln w="28575">
+              <a:solidFill>
+                <a:srgbClr val="FF0000"/>
+              </a:solidFill>
+            </a:ln>
+          </p:spPr>
+          <p:style>
+            <a:lnRef idx="2">
+              <a:schemeClr val="accent1">
+                <a:shade val="50000"/>
+              </a:schemeClr>
+            </a:lnRef>
+            <a:fillRef idx="1">
+              <a:schemeClr val="accent1"/>
+            </a:fillRef>
+            <a:effectRef idx="0">
+              <a:schemeClr val="accent1"/>
+            </a:effectRef>
+            <a:fontRef idx="minor">
+              <a:schemeClr val="lt1"/>
+            </a:fontRef>
+          </p:style>
+          <p:txBody>
+            <a:bodyPr rtlCol="0" anchor="ctr"/>
+            <a:lstStyle/>
+            <a:p>
+              <a:pPr algn="ctr"/>
+              <a:endParaRPr lang="en-US">
+                <a:solidFill>
+                  <a:schemeClr val="tx1"/>
+                </a:solidFill>
+              </a:endParaRPr>
+            </a:p>
+          </p:txBody>
+        </p:sp>
+        <p:sp>
+          <p:nvSpPr>
+            <p:cNvPr id="37" name="Arrow: Curved Down 36"/>
+            <p:cNvSpPr/>
+            <p:nvPr/>
+          </p:nvSpPr>
+          <p:spPr>
+            <a:xfrm flipV="1">
+              <a:off x="8503424" y="4579916"/>
+              <a:ext cx="803662" cy="253816"/>
+            </a:xfrm>
+            <a:prstGeom prst="curvedDownArrow">
+              <a:avLst>
+                <a:gd name="adj1" fmla="val 0"/>
+                <a:gd name="adj2" fmla="val 32007"/>
+                <a:gd name="adj3" fmla="val 31460"/>
+              </a:avLst>
+            </a:prstGeom>
+            <a:solidFill>
+              <a:srgbClr val="FF0000"/>
+            </a:solidFill>
+            <a:ln w="28575">
+              <a:solidFill>
+                <a:srgbClr val="FF0000"/>
+              </a:solidFill>
+            </a:ln>
+          </p:spPr>
+          <p:style>
+            <a:lnRef idx="2">
+              <a:schemeClr val="accent1">
+                <a:shade val="50000"/>
+              </a:schemeClr>
+            </a:lnRef>
+            <a:fillRef idx="1">
+              <a:schemeClr val="accent1"/>
+            </a:fillRef>
+            <a:effectRef idx="0">
+              <a:schemeClr val="accent1"/>
+            </a:effectRef>
+            <a:fontRef idx="minor">
+              <a:schemeClr val="lt1"/>
+            </a:fontRef>
+          </p:style>
+          <p:txBody>
+            <a:bodyPr rtlCol="0" anchor="ctr"/>
+            <a:lstStyle/>
+            <a:p>
+              <a:pPr algn="ctr"/>
+              <a:endParaRPr lang="en-US">
+                <a:solidFill>
+                  <a:schemeClr val="tx1"/>
+                </a:solidFill>
+              </a:endParaRPr>
+            </a:p>
+          </p:txBody>
+        </p:sp>
+        <p:sp>
+          <p:nvSpPr>
+            <p:cNvPr id="38" name="Arrow: Curved Down 37"/>
+            <p:cNvSpPr/>
+            <p:nvPr/>
+          </p:nvSpPr>
+          <p:spPr>
+            <a:xfrm flipV="1">
+              <a:off x="9307086" y="4586103"/>
+              <a:ext cx="803662" cy="253816"/>
+            </a:xfrm>
+            <a:prstGeom prst="curvedDownArrow">
+              <a:avLst>
+                <a:gd name="adj1" fmla="val 0"/>
+                <a:gd name="adj2" fmla="val 32007"/>
+                <a:gd name="adj3" fmla="val 31460"/>
+              </a:avLst>
+            </a:prstGeom>
+            <a:solidFill>
+              <a:srgbClr val="FF0000"/>
+            </a:solidFill>
+            <a:ln w="28575">
+              <a:solidFill>
+                <a:srgbClr val="FF0000"/>
+              </a:solidFill>
+            </a:ln>
+          </p:spPr>
+          <p:style>
+            <a:lnRef idx="2">
+              <a:schemeClr val="accent1">
+                <a:shade val="50000"/>
+              </a:schemeClr>
+            </a:lnRef>
+            <a:fillRef idx="1">
+              <a:schemeClr val="accent1"/>
+            </a:fillRef>
+            <a:effectRef idx="0">
+              <a:schemeClr val="accent1"/>
+            </a:effectRef>
+            <a:fontRef idx="minor">
+              <a:schemeClr val="lt1"/>
+            </a:fontRef>
+          </p:style>
+          <p:txBody>
+            <a:bodyPr rtlCol="0" anchor="ctr"/>
+            <a:lstStyle/>
+            <a:p>
+              <a:pPr algn="ctr"/>
+              <a:endParaRPr lang="en-US">
+                <a:solidFill>
+                  <a:schemeClr val="tx1"/>
+                </a:solidFill>
+              </a:endParaRPr>
+            </a:p>
+          </p:txBody>
+        </p:sp>
+        <p:sp>
+          <p:nvSpPr>
+            <p:cNvPr id="39" name="Oval 38"/>
+            <p:cNvSpPr/>
+            <p:nvPr/>
+          </p:nvSpPr>
+          <p:spPr>
+            <a:xfrm>
+              <a:off x="1992662" y="3618387"/>
+              <a:ext cx="144964" cy="144964"/>
+            </a:xfrm>
+            <a:prstGeom prst="ellipse">
+              <a:avLst/>
+            </a:prstGeom>
+            <a:solidFill>
+              <a:srgbClr val="7030A0"/>
+            </a:solidFill>
+            <a:ln>
+              <a:noFill/>
+            </a:ln>
+          </p:spPr>
+          <p:style>
+            <a:lnRef idx="2">
+              <a:schemeClr val="dk1">
+                <a:shade val="50000"/>
+              </a:schemeClr>
+            </a:lnRef>
+            <a:fillRef idx="1">
+              <a:schemeClr val="dk1"/>
+            </a:fillRef>
+            <a:effectRef idx="0">
+              <a:schemeClr val="dk1"/>
+            </a:effectRef>
+            <a:fontRef idx="minor">
+              <a:schemeClr val="lt1"/>
+            </a:fontRef>
+          </p:style>
+          <p:txBody>
+            <a:bodyPr rtlCol="0" anchor="ctr"/>
+            <a:lstStyle/>
+            <a:p>
+              <a:pPr algn="ctr"/>
+              <a:endParaRPr lang="en-US"/>
+            </a:p>
+          </p:txBody>
+        </p:sp>
+        <p:sp>
+          <p:nvSpPr>
+            <p:cNvPr id="40" name="Oval 39"/>
+            <p:cNvSpPr/>
+            <p:nvPr/>
+          </p:nvSpPr>
+          <p:spPr>
+            <a:xfrm>
+              <a:off x="9965784" y="3600219"/>
+              <a:ext cx="144964" cy="144964"/>
+            </a:xfrm>
+            <a:prstGeom prst="ellipse">
+              <a:avLst/>
+            </a:prstGeom>
+            <a:solidFill>
+              <a:srgbClr val="7030A0"/>
+            </a:solidFill>
+            <a:ln>
+              <a:noFill/>
+            </a:ln>
+          </p:spPr>
+          <p:style>
+            <a:lnRef idx="2">
+              <a:schemeClr val="dk1">
+                <a:shade val="50000"/>
+              </a:schemeClr>
+            </a:lnRef>
+            <a:fillRef idx="1">
+              <a:schemeClr val="dk1"/>
+            </a:fillRef>
+            <a:effectRef idx="0">
+              <a:schemeClr val="dk1"/>
+            </a:effectRef>
+            <a:fontRef idx="minor">
+              <a:schemeClr val="lt1"/>
+            </a:fontRef>
+          </p:style>
+          <p:txBody>
+            <a:bodyPr rtlCol="0" anchor="ctr"/>
+            <a:lstStyle/>
+            <a:p>
+              <a:pPr algn="ctr"/>
+              <a:endParaRPr lang="en-US"/>
+            </a:p>
+          </p:txBody>
+        </p:sp>
+        <p:cxnSp>
+          <p:nvCxnSpPr>
+            <p:cNvPr id="44" name="Straight Connector 43"/>
+            <p:cNvCxnSpPr>
+              <a:cxnSpLocks/>
+              <a:stCxn id="39" idx="6"/>
+              <a:endCxn id="40" idx="2"/>
+            </p:cNvCxnSpPr>
+            <p:nvPr/>
+          </p:nvCxnSpPr>
+          <p:spPr>
+            <a:xfrm flipV="1">
+              <a:off x="2137626" y="3672701"/>
+              <a:ext cx="7828158" cy="18168"/>
+            </a:xfrm>
+            <a:prstGeom prst="line">
+              <a:avLst/>
+            </a:prstGeom>
+            <a:ln w="28575">
+              <a:solidFill>
+                <a:srgbClr val="7030A0"/>
+              </a:solidFill>
+              <a:prstDash val="dash"/>
+            </a:ln>
+          </p:spPr>
+          <p:style>
+            <a:lnRef idx="1">
+              <a:schemeClr val="accent1"/>
+            </a:lnRef>
+            <a:fillRef idx="0">
+              <a:schemeClr val="accent1"/>
+            </a:fillRef>
+            <a:effectRef idx="0">
+              <a:schemeClr val="accent1"/>
+            </a:effectRef>
+            <a:fontRef idx="minor">
+              <a:schemeClr val="tx1"/>
+            </a:fontRef>
+          </p:style>
+        </p:cxnSp>
+        <p:sp>
+          <p:nvSpPr>
+            <p:cNvPr id="48" name="Oval 47"/>
+            <p:cNvSpPr/>
+            <p:nvPr/>
+          </p:nvSpPr>
+          <p:spPr>
+            <a:xfrm>
+              <a:off x="9965784" y="2365779"/>
+              <a:ext cx="144964" cy="144964"/>
+            </a:xfrm>
+            <a:prstGeom prst="ellipse">
+              <a:avLst/>
+            </a:prstGeom>
+            <a:solidFill>
+              <a:srgbClr val="7030A0"/>
+            </a:solidFill>
+            <a:ln>
+              <a:noFill/>
+            </a:ln>
+          </p:spPr>
+          <p:style>
+            <a:lnRef idx="2">
+              <a:schemeClr val="dk1">
+                <a:shade val="50000"/>
+              </a:schemeClr>
+            </a:lnRef>
+            <a:fillRef idx="1">
+              <a:schemeClr val="dk1"/>
+            </a:fillRef>
+            <a:effectRef idx="0">
+              <a:schemeClr val="dk1"/>
+            </a:effectRef>
+            <a:fontRef idx="minor">
+              <a:schemeClr val="lt1"/>
+            </a:fontRef>
+          </p:style>
+          <p:txBody>
+            <a:bodyPr rtlCol="0" anchor="ctr"/>
+            <a:lstStyle/>
+            <a:p>
+              <a:pPr algn="ctr"/>
+              <a:endParaRPr lang="en-US"/>
+            </a:p>
+          </p:txBody>
+        </p:sp>
+        <p:cxnSp>
+          <p:nvCxnSpPr>
+            <p:cNvPr id="49" name="Straight Connector 48"/>
+            <p:cNvCxnSpPr>
+              <a:cxnSpLocks/>
+              <a:stCxn id="39" idx="6"/>
+              <a:endCxn id="48" idx="2"/>
+            </p:cNvCxnSpPr>
+            <p:nvPr/>
+          </p:nvCxnSpPr>
+          <p:spPr>
+            <a:xfrm flipV="1">
+              <a:off x="2137626" y="2438261"/>
+              <a:ext cx="7828158" cy="1252608"/>
+            </a:xfrm>
+            <a:prstGeom prst="line">
+              <a:avLst/>
+            </a:prstGeom>
+            <a:ln w="28575">
+              <a:solidFill>
+                <a:srgbClr val="7030A0"/>
+              </a:solidFill>
+              <a:prstDash val="dash"/>
+            </a:ln>
+          </p:spPr>
+          <p:style>
+            <a:lnRef idx="1">
+              <a:schemeClr val="accent1"/>
+            </a:lnRef>
+            <a:fillRef idx="0">
+              <a:schemeClr val="accent1"/>
+            </a:fillRef>
+            <a:effectRef idx="0">
+              <a:schemeClr val="accent1"/>
+            </a:effectRef>
+            <a:fontRef idx="minor">
+              <a:schemeClr val="tx1"/>
+            </a:fontRef>
+          </p:style>
+        </p:cxnSp>
+        <mc:AlternateContent xmlns:mc="http://schemas.openxmlformats.org/markup-compatibility/2006">
+          <mc:Choice xmlns:a14="http://schemas.microsoft.com/office/drawing/2010/main" Requires="a14">
+            <p:sp>
+              <p:nvSpPr>
+                <p:cNvPr id="52" name="TextBox 51"/>
+                <p:cNvSpPr txBox="1"/>
+                <p:nvPr/>
+              </p:nvSpPr>
+              <p:spPr>
+                <a:xfrm>
+                  <a:off x="1626776" y="3153179"/>
+                  <a:ext cx="772160" cy="369332"/>
+                </a:xfrm>
+                <a:prstGeom prst="rect">
+                  <a:avLst/>
+                </a:prstGeom>
+                <a:noFill/>
+              </p:spPr>
+              <p:txBody>
+                <a:bodyPr wrap="square" rtlCol="0">
+                  <a:spAutoFit/>
+                </a:bodyPr>
+                <a:lstStyle/>
+                <a:p>
+                  <a14:m>
+                    <m:oMathPara xmlns:m="http://schemas.openxmlformats.org/officeDocument/2006/math">
+                      <m:oMathParaPr>
+                        <m:jc m:val="centerGroup"/>
+                      </m:oMathParaPr>
+                      <m:oMath xmlns:m="http://schemas.openxmlformats.org/officeDocument/2006/math">
+                        <m:sSub>
+                          <m:sSubPr>
+                            <m:ctrlPr>
+                              <a:rPr lang="en-US" b="0" i="1" smtClean="0">
+                                <a:solidFill>
+                                  <a:srgbClr val="7030A0"/>
+                                </a:solidFill>
+                                <a:latin typeface="Cambria Math" panose="02040503050406030204" pitchFamily="18" charset="0"/>
+                              </a:rPr>
+                            </m:ctrlPr>
+                          </m:sSubPr>
+                          <m:e>
+                            <m:r>
+                              <a:rPr lang="en-US" b="0" i="1" smtClean="0">
+                                <a:solidFill>
+                                  <a:srgbClr val="7030A0"/>
+                                </a:solidFill>
+                                <a:latin typeface="Cambria Math" panose="02040503050406030204" pitchFamily="18" charset="0"/>
+                              </a:rPr>
+                              <m:t>𝜌</m:t>
+                            </m:r>
+                          </m:e>
+                          <m:sub>
+                            <m:r>
+                              <a:rPr lang="en-US" b="0" i="1" smtClean="0">
+                                <a:solidFill>
+                                  <a:srgbClr val="7030A0"/>
+                                </a:solidFill>
+                                <a:latin typeface="Cambria Math" panose="02040503050406030204" pitchFamily="18" charset="0"/>
+                              </a:rPr>
+                              <m:t>𝑛</m:t>
+                            </m:r>
+                          </m:sub>
+                        </m:sSub>
+                        <m:d>
+                          <m:dPr>
+                            <m:ctrlPr>
+                              <a:rPr lang="en-US" b="0" i="1" smtClean="0">
+                                <a:solidFill>
+                                  <a:srgbClr val="7030A0"/>
+                                </a:solidFill>
+                                <a:latin typeface="Cambria Math" panose="02040503050406030204" pitchFamily="18" charset="0"/>
+                              </a:rPr>
+                            </m:ctrlPr>
+                          </m:dPr>
+                          <m:e>
+                            <m:sSub>
+                              <m:sSubPr>
+                                <m:ctrlPr>
+                                  <a:rPr lang="en-US" b="0" i="1" smtClean="0">
+                                    <a:solidFill>
+                                      <a:srgbClr val="0070C0"/>
+                                    </a:solidFill>
+                                    <a:latin typeface="Cambria Math" panose="02040503050406030204" pitchFamily="18" charset="0"/>
+                                  </a:rPr>
+                                </m:ctrlPr>
+                              </m:sSubPr>
+                              <m:e>
+                                <m:r>
+                                  <a:rPr lang="en-US" b="0" i="1" smtClean="0">
+                                    <a:solidFill>
+                                      <a:srgbClr val="0070C0"/>
+                                    </a:solidFill>
+                                    <a:latin typeface="Cambria Math" panose="02040503050406030204" pitchFamily="18" charset="0"/>
+                                  </a:rPr>
+                                  <m:t>𝜑</m:t>
+                                </m:r>
+                              </m:e>
+                              <m:sub>
+                                <m:r>
+                                  <a:rPr lang="en-US" b="0" i="1" smtClean="0">
+                                    <a:solidFill>
+                                      <a:srgbClr val="0070C0"/>
+                                    </a:solidFill>
+                                    <a:latin typeface="Cambria Math" panose="02040503050406030204" pitchFamily="18" charset="0"/>
+                                  </a:rPr>
+                                  <m:t>𝑛</m:t>
+                                </m:r>
+                              </m:sub>
+                            </m:sSub>
+                          </m:e>
+                        </m:d>
+                      </m:oMath>
+                    </m:oMathPara>
+                  </a14:m>
+                  <a:endParaRPr lang="en-US" dirty="0">
+                    <a:solidFill>
+                      <a:srgbClr val="7030A0"/>
+                    </a:solidFill>
+                  </a:endParaRPr>
+                </a:p>
+              </p:txBody>
+            </p:sp>
+          </mc:Choice>
+          <mc:Fallback>
+            <p:sp>
+              <p:nvSpPr>
+                <p:cNvPr id="52" name="TextBox 51"/>
+                <p:cNvSpPr txBox="1">
+                  <a:spLocks noRot="1" noChangeAspect="1" noMove="1" noResize="1" noEditPoints="1" noAdjustHandles="1" noChangeArrowheads="1" noChangeShapeType="1" noTextEdit="1"/>
+                </p:cNvSpPr>
+                <p:nvPr/>
+              </p:nvSpPr>
+              <p:spPr>
+                <a:xfrm>
+                  <a:off x="1626776" y="3153179"/>
+                  <a:ext cx="772160" cy="369332"/>
+                </a:xfrm>
+                <a:prstGeom prst="rect">
+                  <a:avLst/>
+                </a:prstGeom>
+                <a:blipFill>
+                  <a:blip r:embed="rId2"/>
+                  <a:stretch>
+                    <a:fillRect r="-794" b="-6667"/>
+                  </a:stretch>
+                </a:blipFill>
+              </p:spPr>
+              <p:txBody>
+                <a:bodyPr/>
+                <a:lstStyle/>
+                <a:p>
+                  <a:r>
+                    <a:rPr lang="en-US">
+                      <a:noFill/>
+                    </a:rPr>
+                    <a:t> </a:t>
+                  </a:r>
+                </a:p>
+              </p:txBody>
+            </p:sp>
+          </mc:Fallback>
+        </mc:AlternateContent>
+        <mc:AlternateContent xmlns:mc="http://schemas.openxmlformats.org/markup-compatibility/2006">
+          <mc:Choice xmlns:a14="http://schemas.microsoft.com/office/drawing/2010/main" Requires="a14">
+            <p:sp>
+              <p:nvSpPr>
+                <p:cNvPr id="53" name="TextBox 52"/>
+                <p:cNvSpPr txBox="1"/>
+                <p:nvPr/>
+              </p:nvSpPr>
+              <p:spPr>
+                <a:xfrm>
+                  <a:off x="9790336" y="1872951"/>
+                  <a:ext cx="1275080" cy="419282"/>
+                </a:xfrm>
+                <a:prstGeom prst="rect">
+                  <a:avLst/>
+                </a:prstGeom>
+                <a:noFill/>
+              </p:spPr>
+              <p:txBody>
+                <a:bodyPr wrap="square" rtlCol="0">
+                  <a:spAutoFit/>
+                </a:bodyPr>
+                <a:lstStyle/>
+                <a:p>
+                  <a14:m>
+                    <m:oMathPara xmlns:m="http://schemas.openxmlformats.org/officeDocument/2006/math">
+                      <m:oMathParaPr>
+                        <m:jc m:val="centerGroup"/>
+                      </m:oMathParaPr>
+                      <m:oMath xmlns:m="http://schemas.openxmlformats.org/officeDocument/2006/math">
+                        <m:sSubSup>
+                          <m:sSubSupPr>
+                            <m:ctrlPr>
+                              <a:rPr lang="en-US" b="0" i="1" smtClean="0">
+                                <a:solidFill>
+                                  <a:srgbClr val="7030A0"/>
+                                </a:solidFill>
+                                <a:latin typeface="Cambria Math" panose="02040503050406030204" pitchFamily="18" charset="0"/>
+                              </a:rPr>
+                            </m:ctrlPr>
+                          </m:sSubSupPr>
+                          <m:e>
+                            <m:r>
+                              <a:rPr lang="en-US" b="0" i="1" smtClean="0">
+                                <a:solidFill>
+                                  <a:srgbClr val="7030A0"/>
+                                </a:solidFill>
+                                <a:latin typeface="Cambria Math" panose="02040503050406030204" pitchFamily="18" charset="0"/>
+                              </a:rPr>
+                              <m:t>𝜌</m:t>
+                            </m:r>
+                          </m:e>
+                          <m:sub>
+                            <m:r>
+                              <a:rPr lang="en-US" b="0" i="1" smtClean="0">
+                                <a:solidFill>
+                                  <a:srgbClr val="7030A0"/>
+                                </a:solidFill>
+                                <a:latin typeface="Cambria Math" panose="02040503050406030204" pitchFamily="18" charset="0"/>
+                              </a:rPr>
+                              <m:t>𝑛</m:t>
+                            </m:r>
+                            <m:r>
+                              <a:rPr lang="en-US" b="0" i="1" smtClean="0">
+                                <a:solidFill>
+                                  <a:srgbClr val="7030A0"/>
+                                </a:solidFill>
+                                <a:latin typeface="Cambria Math" panose="02040503050406030204" pitchFamily="18" charset="0"/>
+                              </a:rPr>
+                              <m:t>+1</m:t>
+                            </m:r>
+                          </m:sub>
+                          <m:sup>
+                            <m:r>
+                              <a:rPr lang="en-US" b="0" i="1" smtClean="0">
+                                <a:solidFill>
+                                  <a:srgbClr val="7030A0"/>
+                                </a:solidFill>
+                                <a:latin typeface="Cambria Math" panose="02040503050406030204" pitchFamily="18" charset="0"/>
+                              </a:rPr>
+                              <m:t>𝑘</m:t>
+                            </m:r>
+                          </m:sup>
+                        </m:sSubSup>
+                        <m:d>
+                          <m:dPr>
+                            <m:ctrlPr>
+                              <a:rPr lang="en-US" b="0" i="1" smtClean="0">
+                                <a:solidFill>
+                                  <a:srgbClr val="7030A0"/>
+                                </a:solidFill>
+                                <a:latin typeface="Cambria Math" panose="02040503050406030204" pitchFamily="18" charset="0"/>
+                              </a:rPr>
+                            </m:ctrlPr>
+                          </m:dPr>
+                          <m:e>
+                            <m:sSubSup>
+                              <m:sSubSupPr>
+                                <m:ctrlPr>
+                                  <a:rPr lang="en-US" b="0" i="1" smtClean="0">
+                                    <a:solidFill>
+                                      <a:srgbClr val="0070C0"/>
+                                    </a:solidFill>
+                                    <a:latin typeface="Cambria Math" panose="02040503050406030204" pitchFamily="18" charset="0"/>
+                                  </a:rPr>
+                                </m:ctrlPr>
+                              </m:sSubSupPr>
+                              <m:e>
+                                <m:r>
+                                  <a:rPr lang="en-US" b="0" i="1" smtClean="0">
+                                    <a:solidFill>
+                                      <a:srgbClr val="0070C0"/>
+                                    </a:solidFill>
+                                    <a:latin typeface="Cambria Math" panose="02040503050406030204" pitchFamily="18" charset="0"/>
+                                  </a:rPr>
+                                  <m:t>𝜑</m:t>
+                                </m:r>
+                              </m:e>
+                              <m:sub>
+                                <m:r>
+                                  <a:rPr lang="en-US" b="0" i="1" smtClean="0">
+                                    <a:solidFill>
+                                      <a:srgbClr val="0070C0"/>
+                                    </a:solidFill>
+                                    <a:latin typeface="Cambria Math" panose="02040503050406030204" pitchFamily="18" charset="0"/>
+                                  </a:rPr>
+                                  <m:t>𝑛</m:t>
+                                </m:r>
+                                <m:r>
+                                  <a:rPr lang="en-US" b="0" i="1" smtClean="0">
+                                    <a:solidFill>
+                                      <a:srgbClr val="0070C0"/>
+                                    </a:solidFill>
+                                    <a:latin typeface="Cambria Math" panose="02040503050406030204" pitchFamily="18" charset="0"/>
+                                  </a:rPr>
+                                  <m:t>+1</m:t>
+                                </m:r>
+                              </m:sub>
+                              <m:sup>
+                                <m:r>
+                                  <a:rPr lang="en-US" b="0" i="1" smtClean="0">
+                                    <a:solidFill>
+                                      <a:srgbClr val="0070C0"/>
+                                    </a:solidFill>
+                                    <a:latin typeface="Cambria Math" panose="02040503050406030204" pitchFamily="18" charset="0"/>
+                                  </a:rPr>
+                                  <m:t>𝑘</m:t>
+                                </m:r>
+                              </m:sup>
+                            </m:sSubSup>
+                          </m:e>
+                        </m:d>
+                      </m:oMath>
+                    </m:oMathPara>
+                  </a14:m>
+                  <a:endParaRPr lang="en-US" dirty="0">
+                    <a:solidFill>
+                      <a:srgbClr val="7030A0"/>
+                    </a:solidFill>
+                  </a:endParaRPr>
+                </a:p>
+              </p:txBody>
+            </p:sp>
+          </mc:Choice>
+          <mc:Fallback>
+            <p:sp>
+              <p:nvSpPr>
+                <p:cNvPr id="53" name="TextBox 52"/>
+                <p:cNvSpPr txBox="1">
+                  <a:spLocks noRot="1" noChangeAspect="1" noMove="1" noResize="1" noEditPoints="1" noAdjustHandles="1" noChangeArrowheads="1" noChangeShapeType="1" noTextEdit="1"/>
+                </p:cNvSpPr>
+                <p:nvPr/>
+              </p:nvSpPr>
+              <p:spPr>
+                <a:xfrm>
+                  <a:off x="9790336" y="1872951"/>
+                  <a:ext cx="1275080" cy="419282"/>
+                </a:xfrm>
+                <a:prstGeom prst="rect">
+                  <a:avLst/>
+                </a:prstGeom>
+                <a:blipFill>
+                  <a:blip r:embed="rId3"/>
+                  <a:stretch>
+                    <a:fillRect/>
+                  </a:stretch>
+                </a:blipFill>
+              </p:spPr>
+              <p:txBody>
+                <a:bodyPr/>
+                <a:lstStyle/>
+                <a:p>
+                  <a:r>
+                    <a:rPr lang="en-US">
+                      <a:noFill/>
+                    </a:rPr>
+                    <a:t> </a:t>
+                  </a:r>
+                </a:p>
+              </p:txBody>
+            </p:sp>
+          </mc:Fallback>
+        </mc:AlternateContent>
+        <mc:AlternateContent xmlns:mc="http://schemas.openxmlformats.org/markup-compatibility/2006">
+          <mc:Choice xmlns:a14="http://schemas.microsoft.com/office/drawing/2010/main" Requires="a14">
+            <p:sp>
+              <p:nvSpPr>
+                <p:cNvPr id="54" name="TextBox 53"/>
+                <p:cNvSpPr txBox="1"/>
+                <p:nvPr/>
+              </p:nvSpPr>
+              <p:spPr>
+                <a:xfrm>
+                  <a:off x="9688737" y="3101276"/>
+                  <a:ext cx="1275080" cy="375680"/>
+                </a:xfrm>
+                <a:prstGeom prst="rect">
+                  <a:avLst/>
+                </a:prstGeom>
+                <a:noFill/>
+              </p:spPr>
+              <p:txBody>
+                <a:bodyPr wrap="square" rtlCol="0">
+                  <a:spAutoFit/>
+                </a:bodyPr>
+                <a:lstStyle/>
+                <a:p>
+                  <a14:m>
+                    <m:oMathPara xmlns:m="http://schemas.openxmlformats.org/officeDocument/2006/math">
+                      <m:oMathParaPr>
+                        <m:jc m:val="centerGroup"/>
+                      </m:oMathParaPr>
+                      <m:oMath xmlns:m="http://schemas.openxmlformats.org/officeDocument/2006/math">
+                        <m:sSubSup>
+                          <m:sSubSupPr>
+                            <m:ctrlPr>
+                              <a:rPr lang="en-US" b="0" i="1" smtClean="0">
+                                <a:solidFill>
+                                  <a:srgbClr val="7030A0"/>
+                                </a:solidFill>
+                                <a:latin typeface="Cambria Math" panose="02040503050406030204" pitchFamily="18" charset="0"/>
+                              </a:rPr>
+                            </m:ctrlPr>
+                          </m:sSubSupPr>
+                          <m:e>
+                            <m:r>
+                              <a:rPr lang="en-US" b="0" i="1" smtClean="0">
+                                <a:solidFill>
+                                  <a:srgbClr val="7030A0"/>
+                                </a:solidFill>
+                                <a:latin typeface="Cambria Math" panose="02040503050406030204" pitchFamily="18" charset="0"/>
+                              </a:rPr>
+                              <m:t>𝜌</m:t>
+                            </m:r>
+                          </m:e>
+                          <m:sub>
+                            <m:r>
+                              <a:rPr lang="en-US" b="0" i="1" smtClean="0">
+                                <a:solidFill>
+                                  <a:srgbClr val="7030A0"/>
+                                </a:solidFill>
+                                <a:latin typeface="Cambria Math" panose="02040503050406030204" pitchFamily="18" charset="0"/>
+                              </a:rPr>
+                              <m:t>𝑛</m:t>
+                            </m:r>
+                            <m:r>
+                              <a:rPr lang="en-US" b="0" i="1" smtClean="0">
+                                <a:solidFill>
+                                  <a:srgbClr val="7030A0"/>
+                                </a:solidFill>
+                                <a:latin typeface="Cambria Math" panose="02040503050406030204" pitchFamily="18" charset="0"/>
+                              </a:rPr>
+                              <m:t>+1</m:t>
+                            </m:r>
+                          </m:sub>
+                          <m:sup>
+                            <m:r>
+                              <a:rPr lang="en-US" b="0" i="1" smtClean="0">
+                                <a:solidFill>
+                                  <a:srgbClr val="7030A0"/>
+                                </a:solidFill>
+                                <a:latin typeface="Cambria Math" panose="02040503050406030204" pitchFamily="18" charset="0"/>
+                              </a:rPr>
+                              <m:t>0</m:t>
+                            </m:r>
+                          </m:sup>
+                        </m:sSubSup>
+                        <m:d>
+                          <m:dPr>
+                            <m:ctrlPr>
+                              <a:rPr lang="en-US" b="0" i="1" smtClean="0">
+                                <a:solidFill>
+                                  <a:srgbClr val="7030A0"/>
+                                </a:solidFill>
+                                <a:latin typeface="Cambria Math" panose="02040503050406030204" pitchFamily="18" charset="0"/>
+                              </a:rPr>
+                            </m:ctrlPr>
+                          </m:dPr>
+                          <m:e>
+                            <m:sSubSup>
+                              <m:sSubSupPr>
+                                <m:ctrlPr>
+                                  <a:rPr lang="en-US" b="0" i="1" smtClean="0">
+                                    <a:solidFill>
+                                      <a:srgbClr val="0070C0"/>
+                                    </a:solidFill>
+                                    <a:latin typeface="Cambria Math" panose="02040503050406030204" pitchFamily="18" charset="0"/>
+                                  </a:rPr>
+                                </m:ctrlPr>
+                              </m:sSubSupPr>
+                              <m:e>
+                                <m:r>
+                                  <a:rPr lang="en-US" b="0" i="1" smtClean="0">
+                                    <a:solidFill>
+                                      <a:srgbClr val="0070C0"/>
+                                    </a:solidFill>
+                                    <a:latin typeface="Cambria Math" panose="02040503050406030204" pitchFamily="18" charset="0"/>
+                                  </a:rPr>
+                                  <m:t>𝜑</m:t>
+                                </m:r>
+                              </m:e>
+                              <m:sub>
+                                <m:r>
+                                  <a:rPr lang="en-US" b="0" i="1" smtClean="0">
+                                    <a:solidFill>
+                                      <a:srgbClr val="0070C0"/>
+                                    </a:solidFill>
+                                    <a:latin typeface="Cambria Math" panose="02040503050406030204" pitchFamily="18" charset="0"/>
+                                  </a:rPr>
+                                  <m:t>𝑛</m:t>
+                                </m:r>
+                                <m:r>
+                                  <a:rPr lang="en-US" b="0" i="1" smtClean="0">
+                                    <a:solidFill>
+                                      <a:srgbClr val="0070C0"/>
+                                    </a:solidFill>
+                                    <a:latin typeface="Cambria Math" panose="02040503050406030204" pitchFamily="18" charset="0"/>
+                                  </a:rPr>
+                                  <m:t>+1</m:t>
+                                </m:r>
+                              </m:sub>
+                              <m:sup>
+                                <m:r>
+                                  <a:rPr lang="en-US" b="0" i="1" smtClean="0">
+                                    <a:solidFill>
+                                      <a:srgbClr val="0070C0"/>
+                                    </a:solidFill>
+                                    <a:latin typeface="Cambria Math" panose="02040503050406030204" pitchFamily="18" charset="0"/>
+                                  </a:rPr>
+                                  <m:t>0</m:t>
+                                </m:r>
+                              </m:sup>
+                            </m:sSubSup>
+                          </m:e>
+                        </m:d>
+                      </m:oMath>
+                    </m:oMathPara>
+                  </a14:m>
+                  <a:endParaRPr lang="en-US" dirty="0">
+                    <a:solidFill>
+                      <a:srgbClr val="7030A0"/>
+                    </a:solidFill>
+                  </a:endParaRPr>
+                </a:p>
+              </p:txBody>
+            </p:sp>
+          </mc:Choice>
+          <mc:Fallback>
+            <p:sp>
+              <p:nvSpPr>
+                <p:cNvPr id="54" name="TextBox 53"/>
+                <p:cNvSpPr txBox="1">
+                  <a:spLocks noRot="1" noChangeAspect="1" noMove="1" noResize="1" noEditPoints="1" noAdjustHandles="1" noChangeArrowheads="1" noChangeShapeType="1" noTextEdit="1"/>
+                </p:cNvSpPr>
+                <p:nvPr/>
+              </p:nvSpPr>
+              <p:spPr>
+                <a:xfrm>
+                  <a:off x="9688737" y="3101276"/>
+                  <a:ext cx="1275080" cy="375680"/>
+                </a:xfrm>
+                <a:prstGeom prst="rect">
+                  <a:avLst/>
+                </a:prstGeom>
+                <a:blipFill>
+                  <a:blip r:embed="rId4"/>
+                  <a:stretch>
+                    <a:fillRect b="-6452"/>
+                  </a:stretch>
+                </a:blipFill>
+              </p:spPr>
+              <p:txBody>
+                <a:bodyPr/>
+                <a:lstStyle/>
+                <a:p>
+                  <a:r>
+                    <a:rPr lang="en-US">
+                      <a:noFill/>
+                    </a:rPr>
+                    <a:t> </a:t>
+                  </a:r>
+                </a:p>
+              </p:txBody>
+            </p:sp>
+          </mc:Fallback>
+        </mc:AlternateContent>
+        <mc:AlternateContent xmlns:mc="http://schemas.openxmlformats.org/markup-compatibility/2006">
+          <mc:Choice xmlns:a14="http://schemas.microsoft.com/office/drawing/2010/main" Requires="a14">
+            <p:sp>
+              <p:nvSpPr>
+                <p:cNvPr id="55" name="TextBox 54"/>
+                <p:cNvSpPr txBox="1"/>
+                <p:nvPr/>
+              </p:nvSpPr>
+              <p:spPr>
+                <a:xfrm>
+                  <a:off x="5445914" y="2560462"/>
+                  <a:ext cx="1275080" cy="374270"/>
+                </a:xfrm>
+                <a:prstGeom prst="rect">
+                  <a:avLst/>
+                </a:prstGeom>
+                <a:noFill/>
+              </p:spPr>
+              <p:txBody>
+                <a:bodyPr wrap="square" rtlCol="0">
+                  <a:spAutoFit/>
+                </a:bodyPr>
+                <a:lstStyle/>
+                <a:p>
+                  <a14:m>
+                    <m:oMathPara xmlns:m="http://schemas.openxmlformats.org/officeDocument/2006/math">
+                      <m:oMathParaPr>
+                        <m:jc m:val="centerGroup"/>
+                      </m:oMathParaPr>
+                      <m:oMath xmlns:m="http://schemas.openxmlformats.org/officeDocument/2006/math">
+                        <m:sSup>
+                          <m:sSupPr>
+                            <m:ctrlPr>
+                              <a:rPr lang="en-US" b="0" i="1" smtClean="0">
+                                <a:solidFill>
+                                  <a:srgbClr val="7030A0"/>
+                                </a:solidFill>
+                                <a:latin typeface="Cambria Math" panose="02040503050406030204" pitchFamily="18" charset="0"/>
+                              </a:rPr>
+                            </m:ctrlPr>
+                          </m:sSupPr>
+                          <m:e>
+                            <m:r>
+                              <a:rPr lang="en-US" b="0" i="1" smtClean="0">
+                                <a:solidFill>
+                                  <a:srgbClr val="7030A0"/>
+                                </a:solidFill>
+                                <a:latin typeface="Cambria Math" panose="02040503050406030204" pitchFamily="18" charset="0"/>
+                              </a:rPr>
+                              <m:t>𝜌</m:t>
+                            </m:r>
+                          </m:e>
+                          <m:sup>
+                            <m:r>
+                              <a:rPr lang="en-US" b="0" i="1" smtClean="0">
+                                <a:solidFill>
+                                  <a:srgbClr val="7030A0"/>
+                                </a:solidFill>
+                                <a:latin typeface="Cambria Math" panose="02040503050406030204" pitchFamily="18" charset="0"/>
+                              </a:rPr>
+                              <m:t>𝑘</m:t>
+                            </m:r>
+                          </m:sup>
+                        </m:sSup>
+                        <m:d>
+                          <m:dPr>
+                            <m:ctrlPr>
+                              <a:rPr lang="en-US" b="0" i="1" smtClean="0">
+                                <a:solidFill>
+                                  <a:srgbClr val="7030A0"/>
+                                </a:solidFill>
+                                <a:latin typeface="Cambria Math" panose="02040503050406030204" pitchFamily="18" charset="0"/>
+                              </a:rPr>
+                            </m:ctrlPr>
+                          </m:dPr>
+                          <m:e>
+                            <m:r>
+                              <a:rPr lang="en-US" b="0" i="1" smtClean="0">
+                                <a:solidFill>
+                                  <a:schemeClr val="tx1"/>
+                                </a:solidFill>
+                                <a:latin typeface="Cambria Math" panose="02040503050406030204" pitchFamily="18" charset="0"/>
+                              </a:rPr>
+                              <m:t>𝑡</m:t>
+                            </m:r>
+                          </m:e>
+                        </m:d>
+                      </m:oMath>
+                    </m:oMathPara>
+                  </a14:m>
+                  <a:endParaRPr lang="en-US" dirty="0">
+                    <a:solidFill>
+                      <a:srgbClr val="7030A0"/>
+                    </a:solidFill>
+                  </a:endParaRPr>
+                </a:p>
+              </p:txBody>
+            </p:sp>
+          </mc:Choice>
+          <mc:Fallback>
+            <p:sp>
+              <p:nvSpPr>
+                <p:cNvPr id="55" name="TextBox 54"/>
+                <p:cNvSpPr txBox="1">
+                  <a:spLocks noRot="1" noChangeAspect="1" noMove="1" noResize="1" noEditPoints="1" noAdjustHandles="1" noChangeArrowheads="1" noChangeShapeType="1" noTextEdit="1"/>
+                </p:cNvSpPr>
+                <p:nvPr/>
+              </p:nvSpPr>
+              <p:spPr>
+                <a:xfrm>
+                  <a:off x="5445914" y="2560462"/>
+                  <a:ext cx="1275080" cy="374270"/>
+                </a:xfrm>
+                <a:prstGeom prst="rect">
+                  <a:avLst/>
+                </a:prstGeom>
+                <a:blipFill>
+                  <a:blip r:embed="rId5"/>
+                  <a:stretch>
+                    <a:fillRect b="-6557"/>
+                  </a:stretch>
+                </a:blipFill>
+              </p:spPr>
+              <p:txBody>
+                <a:bodyPr/>
+                <a:lstStyle/>
+                <a:p>
+                  <a:r>
+                    <a:rPr lang="en-US">
+                      <a:noFill/>
+                    </a:rPr>
+                    <a:t> </a:t>
+                  </a:r>
+                </a:p>
+              </p:txBody>
+            </p:sp>
+          </mc:Fallback>
+        </mc:AlternateContent>
+        <mc:AlternateContent xmlns:mc="http://schemas.openxmlformats.org/markup-compatibility/2006">
+          <mc:Choice xmlns:a14="http://schemas.microsoft.com/office/drawing/2010/main" Requires="a14">
+            <p:sp>
+              <p:nvSpPr>
+                <p:cNvPr id="56" name="TextBox 55"/>
+                <p:cNvSpPr txBox="1"/>
+                <p:nvPr/>
+              </p:nvSpPr>
+              <p:spPr>
+                <a:xfrm>
+                  <a:off x="5974234" y="3249883"/>
+                  <a:ext cx="1275080" cy="369332"/>
+                </a:xfrm>
+                <a:prstGeom prst="rect">
+                  <a:avLst/>
+                </a:prstGeom>
+                <a:noFill/>
+              </p:spPr>
+              <p:txBody>
+                <a:bodyPr wrap="square" rtlCol="0">
+                  <a:spAutoFit/>
+                </a:bodyPr>
+                <a:lstStyle/>
+                <a:p>
+                  <a14:m>
+                    <m:oMathPara xmlns:m="http://schemas.openxmlformats.org/officeDocument/2006/math">
+                      <m:oMathParaPr>
+                        <m:jc m:val="centerGroup"/>
+                      </m:oMathParaPr>
+                      <m:oMath xmlns:m="http://schemas.openxmlformats.org/officeDocument/2006/math">
+                        <m:sSup>
+                          <m:sSupPr>
+                            <m:ctrlPr>
+                              <a:rPr lang="en-US" b="0" i="1" smtClean="0">
+                                <a:solidFill>
+                                  <a:srgbClr val="7030A0"/>
+                                </a:solidFill>
+                                <a:latin typeface="Cambria Math" panose="02040503050406030204" pitchFamily="18" charset="0"/>
+                              </a:rPr>
+                            </m:ctrlPr>
+                          </m:sSupPr>
+                          <m:e>
+                            <m:r>
+                              <a:rPr lang="en-US" b="0" i="1" smtClean="0">
+                                <a:solidFill>
+                                  <a:srgbClr val="7030A0"/>
+                                </a:solidFill>
+                                <a:latin typeface="Cambria Math" panose="02040503050406030204" pitchFamily="18" charset="0"/>
+                              </a:rPr>
+                              <m:t>𝜌</m:t>
+                            </m:r>
+                          </m:e>
+                          <m:sup>
+                            <m:r>
+                              <a:rPr lang="en-US" b="0" i="1" smtClean="0">
+                                <a:solidFill>
+                                  <a:srgbClr val="7030A0"/>
+                                </a:solidFill>
+                                <a:latin typeface="Cambria Math" panose="02040503050406030204" pitchFamily="18" charset="0"/>
+                              </a:rPr>
+                              <m:t>0</m:t>
+                            </m:r>
+                          </m:sup>
+                        </m:sSup>
+                        <m:d>
+                          <m:dPr>
+                            <m:ctrlPr>
+                              <a:rPr lang="en-US" b="0" i="1" smtClean="0">
+                                <a:solidFill>
+                                  <a:srgbClr val="7030A0"/>
+                                </a:solidFill>
+                                <a:latin typeface="Cambria Math" panose="02040503050406030204" pitchFamily="18" charset="0"/>
+                              </a:rPr>
+                            </m:ctrlPr>
+                          </m:dPr>
+                          <m:e>
+                            <m:r>
+                              <a:rPr lang="en-US" b="0" i="1" smtClean="0">
+                                <a:solidFill>
+                                  <a:schemeClr val="tx1"/>
+                                </a:solidFill>
+                                <a:latin typeface="Cambria Math" panose="02040503050406030204" pitchFamily="18" charset="0"/>
+                              </a:rPr>
+                              <m:t>𝑡</m:t>
+                            </m:r>
+                          </m:e>
+                        </m:d>
+                      </m:oMath>
+                    </m:oMathPara>
+                  </a14:m>
+                  <a:endParaRPr lang="en-US" dirty="0">
+                    <a:solidFill>
+                      <a:srgbClr val="7030A0"/>
+                    </a:solidFill>
+                  </a:endParaRPr>
+                </a:p>
+              </p:txBody>
+            </p:sp>
+          </mc:Choice>
+          <mc:Fallback>
+            <p:sp>
+              <p:nvSpPr>
+                <p:cNvPr id="56" name="TextBox 55"/>
+                <p:cNvSpPr txBox="1">
+                  <a:spLocks noRot="1" noChangeAspect="1" noMove="1" noResize="1" noEditPoints="1" noAdjustHandles="1" noChangeArrowheads="1" noChangeShapeType="1" noTextEdit="1"/>
+                </p:cNvSpPr>
+                <p:nvPr/>
+              </p:nvSpPr>
+              <p:spPr>
+                <a:xfrm>
+                  <a:off x="5974234" y="3249883"/>
+                  <a:ext cx="1275080" cy="369332"/>
+                </a:xfrm>
+                <a:prstGeom prst="rect">
+                  <a:avLst/>
+                </a:prstGeom>
+                <a:blipFill>
+                  <a:blip r:embed="rId6"/>
+                  <a:stretch>
+                    <a:fillRect b="-6667"/>
+                  </a:stretch>
+                </a:blipFill>
+              </p:spPr>
+              <p:txBody>
+                <a:bodyPr/>
+                <a:lstStyle/>
+                <a:p>
+                  <a:r>
+                    <a:rPr lang="en-US">
+                      <a:noFill/>
+                    </a:rPr>
+                    <a:t> </a:t>
+                  </a:r>
+                </a:p>
+              </p:txBody>
+            </p:sp>
+          </mc:Fallback>
+        </mc:AlternateContent>
+        <mc:AlternateContent xmlns:mc="http://schemas.openxmlformats.org/markup-compatibility/2006">
+          <mc:Choice xmlns:a14="http://schemas.microsoft.com/office/drawing/2010/main" Requires="a14">
+            <p:sp>
+              <p:nvSpPr>
+                <p:cNvPr id="57" name="TextBox 56"/>
+                <p:cNvSpPr txBox="1"/>
+                <p:nvPr/>
+              </p:nvSpPr>
+              <p:spPr>
+                <a:xfrm>
+                  <a:off x="5340350" y="4933950"/>
+                  <a:ext cx="1524568" cy="461665"/>
+                </a:xfrm>
+                <a:prstGeom prst="rect">
+                  <a:avLst/>
+                </a:prstGeom>
+                <a:noFill/>
+              </p:spPr>
+              <p:txBody>
+                <a:bodyPr wrap="square" rtlCol="0">
+                  <a:spAutoFit/>
+                </a:bodyPr>
+                <a:lstStyle/>
+                <a:p>
+                  <a14:m>
+                    <m:oMathPara xmlns:m="http://schemas.openxmlformats.org/officeDocument/2006/math">
+                      <m:oMathParaPr>
+                        <m:jc m:val="centerGroup"/>
+                      </m:oMathParaPr>
+                      <m:oMath xmlns:m="http://schemas.openxmlformats.org/officeDocument/2006/math">
+                        <m:r>
+                          <a:rPr lang="en-US" sz="2400" b="0" i="1" smtClean="0">
+                            <a:solidFill>
+                              <a:srgbClr val="FF0000"/>
+                            </a:solidFill>
+                            <a:latin typeface="Cambria Math" panose="02040503050406030204" pitchFamily="18" charset="0"/>
+                          </a:rPr>
+                          <m:t>𝑝</m:t>
+                        </m:r>
+                        <m:d>
+                          <m:dPr>
+                            <m:ctrlPr>
+                              <a:rPr lang="en-US" sz="2400" b="0" i="1" smtClean="0">
+                                <a:solidFill>
+                                  <a:srgbClr val="FF0000"/>
+                                </a:solidFill>
+                                <a:latin typeface="Cambria Math" panose="02040503050406030204" pitchFamily="18" charset="0"/>
+                              </a:rPr>
+                            </m:ctrlPr>
+                          </m:dPr>
+                          <m:e>
+                            <m:r>
+                              <a:rPr lang="en-US" sz="2400" b="0" i="1" smtClean="0">
+                                <a:solidFill>
+                                  <a:schemeClr val="tx1"/>
+                                </a:solidFill>
+                                <a:latin typeface="Cambria Math" panose="02040503050406030204" pitchFamily="18" charset="0"/>
+                              </a:rPr>
+                              <m:t>𝑡</m:t>
+                            </m:r>
+                          </m:e>
+                        </m:d>
+                      </m:oMath>
+                    </m:oMathPara>
+                  </a14:m>
+                  <a:endParaRPr lang="en-US" sz="2400" dirty="0">
+                    <a:solidFill>
+                      <a:srgbClr val="FF0000"/>
+                    </a:solidFill>
+                  </a:endParaRPr>
+                </a:p>
+              </p:txBody>
+            </p:sp>
+          </mc:Choice>
+          <mc:Fallback>
+            <p:sp>
+              <p:nvSpPr>
+                <p:cNvPr id="57" name="TextBox 56"/>
+                <p:cNvSpPr txBox="1">
+                  <a:spLocks noRot="1" noChangeAspect="1" noMove="1" noResize="1" noEditPoints="1" noAdjustHandles="1" noChangeArrowheads="1" noChangeShapeType="1" noTextEdit="1"/>
+                </p:cNvSpPr>
+                <p:nvPr/>
+              </p:nvSpPr>
+              <p:spPr>
+                <a:xfrm>
+                  <a:off x="5340350" y="4933950"/>
+                  <a:ext cx="1524568" cy="461665"/>
+                </a:xfrm>
+                <a:prstGeom prst="rect">
+                  <a:avLst/>
+                </a:prstGeom>
+                <a:blipFill>
+                  <a:blip r:embed="rId7"/>
+                  <a:stretch>
+                    <a:fillRect b="-9211"/>
+                  </a:stretch>
+                </a:blipFill>
+              </p:spPr>
+              <p:txBody>
+                <a:bodyPr/>
+                <a:lstStyle/>
+                <a:p>
+                  <a:r>
+                    <a:rPr lang="en-US">
+                      <a:noFill/>
+                    </a:rPr>
+                    <a:t> </a:t>
+                  </a:r>
+                </a:p>
+              </p:txBody>
+            </p:sp>
+          </mc:Fallback>
+        </mc:AlternateContent>
+        <mc:AlternateContent xmlns:mc="http://schemas.openxmlformats.org/markup-compatibility/2006">
+          <mc:Choice xmlns:a14="http://schemas.microsoft.com/office/drawing/2010/main" Requires="a14">
+            <p:sp>
+              <p:nvSpPr>
+                <p:cNvPr id="58" name="TextBox 57"/>
+                <p:cNvSpPr txBox="1"/>
+                <p:nvPr/>
+              </p:nvSpPr>
+              <p:spPr>
+                <a:xfrm>
+                  <a:off x="5340350" y="5597529"/>
+                  <a:ext cx="1524568" cy="461665"/>
+                </a:xfrm>
+                <a:prstGeom prst="rect">
+                  <a:avLst/>
+                </a:prstGeom>
+                <a:noFill/>
+              </p:spPr>
+              <p:txBody>
+                <a:bodyPr wrap="square" rtlCol="0">
+                  <a:spAutoFit/>
+                </a:bodyPr>
+                <a:lstStyle/>
+                <a:p>
+                  <a14:m>
+                    <m:oMathPara xmlns:m="http://schemas.openxmlformats.org/officeDocument/2006/math">
+                      <m:oMathParaPr>
+                        <m:jc m:val="centerGroup"/>
+                      </m:oMathParaPr>
+                      <m:oMath xmlns:m="http://schemas.openxmlformats.org/officeDocument/2006/math">
+                        <m:r>
+                          <a:rPr lang="en-US" sz="2400" b="0" i="1" smtClean="0">
+                            <a:solidFill>
+                              <a:srgbClr val="0070C0"/>
+                            </a:solidFill>
+                            <a:latin typeface="Cambria Math" panose="02040503050406030204" pitchFamily="18" charset="0"/>
+                          </a:rPr>
+                          <m:t>𝜑</m:t>
+                        </m:r>
+                        <m:d>
+                          <m:dPr>
+                            <m:ctrlPr>
+                              <a:rPr lang="en-US" sz="2400" b="0" i="1" smtClean="0">
+                                <a:solidFill>
+                                  <a:srgbClr val="0070C0"/>
+                                </a:solidFill>
+                                <a:latin typeface="Cambria Math" panose="02040503050406030204" pitchFamily="18" charset="0"/>
+                              </a:rPr>
+                            </m:ctrlPr>
+                          </m:dPr>
+                          <m:e>
+                            <m:r>
+                              <a:rPr lang="en-US" sz="2400" b="0" i="1" smtClean="0">
+                                <a:solidFill>
+                                  <a:schemeClr val="tx1"/>
+                                </a:solidFill>
+                                <a:latin typeface="Cambria Math" panose="02040503050406030204" pitchFamily="18" charset="0"/>
+                              </a:rPr>
+                              <m:t>𝑡</m:t>
+                            </m:r>
+                          </m:e>
+                        </m:d>
+                      </m:oMath>
+                    </m:oMathPara>
+                  </a14:m>
+                  <a:endParaRPr lang="en-US" sz="2400" dirty="0">
+                    <a:solidFill>
+                      <a:srgbClr val="0070C0"/>
+                    </a:solidFill>
+                  </a:endParaRPr>
+                </a:p>
+              </p:txBody>
+            </p:sp>
+          </mc:Choice>
+          <mc:Fallback>
+            <p:sp>
+              <p:nvSpPr>
+                <p:cNvPr id="58" name="TextBox 57"/>
+                <p:cNvSpPr txBox="1">
+                  <a:spLocks noRot="1" noChangeAspect="1" noMove="1" noResize="1" noEditPoints="1" noAdjustHandles="1" noChangeArrowheads="1" noChangeShapeType="1" noTextEdit="1"/>
+                </p:cNvSpPr>
+                <p:nvPr/>
+              </p:nvSpPr>
+              <p:spPr>
+                <a:xfrm>
+                  <a:off x="5340350" y="5597529"/>
+                  <a:ext cx="1524568" cy="461665"/>
+                </a:xfrm>
+                <a:prstGeom prst="rect">
+                  <a:avLst/>
+                </a:prstGeom>
+                <a:blipFill>
+                  <a:blip r:embed="rId8"/>
+                  <a:stretch>
+                    <a:fillRect b="-9211"/>
+                  </a:stretch>
+                </a:blipFill>
+              </p:spPr>
+              <p:txBody>
+                <a:bodyPr/>
+                <a:lstStyle/>
+                <a:p>
+                  <a:r>
+                    <a:rPr lang="en-US">
+                      <a:noFill/>
+                    </a:rPr>
+                    <a:t> </a:t>
+                  </a:r>
+                </a:p>
+              </p:txBody>
+            </p:sp>
+          </mc:Fallback>
+        </mc:AlternateContent>
+        <mc:AlternateContent xmlns:mc="http://schemas.openxmlformats.org/markup-compatibility/2006">
+          <mc:Choice xmlns:a14="http://schemas.microsoft.com/office/drawing/2010/main" Requires="a14">
+            <p:sp>
+              <p:nvSpPr>
+                <p:cNvPr id="59" name="TextBox 58"/>
+                <p:cNvSpPr txBox="1"/>
+                <p:nvPr/>
+              </p:nvSpPr>
+              <p:spPr>
+                <a:xfrm>
+                  <a:off x="864492" y="3522511"/>
+                  <a:ext cx="1524568" cy="369332"/>
+                </a:xfrm>
+                <a:prstGeom prst="rect">
+                  <a:avLst/>
+                </a:prstGeom>
+                <a:noFill/>
+              </p:spPr>
+              <p:txBody>
+                <a:bodyPr wrap="square" rtlCol="0">
+                  <a:spAutoFit/>
+                </a:bodyPr>
+                <a:lstStyle/>
+                <a:p>
+                  <a14:m>
+                    <m:oMathPara xmlns:m="http://schemas.openxmlformats.org/officeDocument/2006/math">
+                      <m:oMathParaPr>
+                        <m:jc m:val="centerGroup"/>
+                      </m:oMathParaPr>
+                      <m:oMath xmlns:m="http://schemas.openxmlformats.org/officeDocument/2006/math">
+                        <m:sSub>
+                          <m:sSubPr>
+                            <m:ctrlPr>
+                              <a:rPr lang="en-US" b="0" i="1" smtClean="0">
+                                <a:solidFill>
+                                  <a:srgbClr val="0070C0"/>
+                                </a:solidFill>
+                                <a:latin typeface="Cambria Math" panose="02040503050406030204" pitchFamily="18" charset="0"/>
+                              </a:rPr>
+                            </m:ctrlPr>
+                          </m:sSubPr>
+                          <m:e>
+                            <m:r>
+                              <a:rPr lang="en-US" b="0" i="1" smtClean="0">
+                                <a:solidFill>
+                                  <a:srgbClr val="0070C0"/>
+                                </a:solidFill>
+                                <a:latin typeface="Cambria Math" panose="02040503050406030204" pitchFamily="18" charset="0"/>
+                              </a:rPr>
+                              <m:t>𝜑</m:t>
+                            </m:r>
+                          </m:e>
+                          <m:sub>
+                            <m:r>
+                              <a:rPr lang="en-US" b="0" i="1" smtClean="0">
+                                <a:solidFill>
+                                  <a:srgbClr val="0070C0"/>
+                                </a:solidFill>
+                                <a:latin typeface="Cambria Math" panose="02040503050406030204" pitchFamily="18" charset="0"/>
+                              </a:rPr>
+                              <m:t>𝑛</m:t>
+                            </m:r>
+                          </m:sub>
+                        </m:sSub>
+                        <m:d>
+                          <m:dPr>
+                            <m:ctrlPr>
+                              <a:rPr lang="en-US" b="0" i="1" smtClean="0">
+                                <a:solidFill>
+                                  <a:srgbClr val="0070C0"/>
+                                </a:solidFill>
+                                <a:latin typeface="Cambria Math" panose="02040503050406030204" pitchFamily="18" charset="0"/>
+                              </a:rPr>
+                            </m:ctrlPr>
+                          </m:dPr>
+                          <m:e>
+                            <m:sSub>
+                              <m:sSubPr>
+                                <m:ctrlPr>
+                                  <a:rPr lang="en-US" b="0" i="1" smtClean="0">
+                                    <a:solidFill>
+                                      <a:srgbClr val="FF0000"/>
+                                    </a:solidFill>
+                                    <a:latin typeface="Cambria Math" panose="02040503050406030204" pitchFamily="18" charset="0"/>
+                                  </a:rPr>
+                                </m:ctrlPr>
+                              </m:sSubPr>
+                              <m:e>
+                                <m:r>
+                                  <a:rPr lang="en-US" b="0" i="1" smtClean="0">
+                                    <a:solidFill>
+                                      <a:srgbClr val="FF0000"/>
+                                    </a:solidFill>
+                                    <a:latin typeface="Cambria Math" panose="02040503050406030204" pitchFamily="18" charset="0"/>
+                                  </a:rPr>
+                                  <m:t>𝑝</m:t>
+                                </m:r>
+                              </m:e>
+                              <m:sub>
+                                <m:r>
+                                  <a:rPr lang="en-US" b="0" i="1" smtClean="0">
+                                    <a:solidFill>
+                                      <a:srgbClr val="FF0000"/>
+                                    </a:solidFill>
+                                    <a:latin typeface="Cambria Math" panose="02040503050406030204" pitchFamily="18" charset="0"/>
+                                  </a:rPr>
+                                  <m:t>𝑛</m:t>
+                                </m:r>
+                              </m:sub>
+                            </m:sSub>
+                            <m:r>
+                              <a:rPr lang="en-US" b="0" i="1" smtClean="0">
+                                <a:solidFill>
+                                  <a:srgbClr val="FF0000"/>
+                                </a:solidFill>
+                                <a:latin typeface="Cambria Math" panose="02040503050406030204" pitchFamily="18" charset="0"/>
+                              </a:rPr>
+                              <m:t> </m:t>
+                            </m:r>
+                          </m:e>
+                        </m:d>
+                      </m:oMath>
+                    </m:oMathPara>
+                  </a14:m>
+                  <a:endParaRPr lang="en-US" dirty="0">
+                    <a:solidFill>
+                      <a:srgbClr val="0070C0"/>
+                    </a:solidFill>
+                  </a:endParaRPr>
+                </a:p>
+              </p:txBody>
+            </p:sp>
+          </mc:Choice>
+          <mc:Fallback>
+            <p:sp>
+              <p:nvSpPr>
+                <p:cNvPr id="59" name="TextBox 58"/>
+                <p:cNvSpPr txBox="1">
+                  <a:spLocks noRot="1" noChangeAspect="1" noMove="1" noResize="1" noEditPoints="1" noAdjustHandles="1" noChangeArrowheads="1" noChangeShapeType="1" noTextEdit="1"/>
+                </p:cNvSpPr>
+                <p:nvPr/>
+              </p:nvSpPr>
+              <p:spPr>
+                <a:xfrm>
+                  <a:off x="864492" y="3522511"/>
+                  <a:ext cx="1524568" cy="369332"/>
+                </a:xfrm>
+                <a:prstGeom prst="rect">
+                  <a:avLst/>
+                </a:prstGeom>
+                <a:blipFill>
+                  <a:blip r:embed="rId9"/>
+                  <a:stretch>
+                    <a:fillRect b="-6557"/>
+                  </a:stretch>
+                </a:blipFill>
+              </p:spPr>
+              <p:txBody>
+                <a:bodyPr/>
+                <a:lstStyle/>
+                <a:p>
+                  <a:r>
+                    <a:rPr lang="en-US">
+                      <a:noFill/>
+                    </a:rPr>
+                    <a:t> </a:t>
+                  </a:r>
+                </a:p>
+              </p:txBody>
+            </p:sp>
+          </mc:Fallback>
+        </mc:AlternateContent>
+        <mc:AlternateContent xmlns:mc="http://schemas.openxmlformats.org/markup-compatibility/2006">
+          <mc:Choice xmlns:a14="http://schemas.microsoft.com/office/drawing/2010/main" Requires="a14">
+            <p:sp>
+              <p:nvSpPr>
+                <p:cNvPr id="60" name="TextBox 59"/>
+                <p:cNvSpPr txBox="1"/>
+                <p:nvPr/>
+              </p:nvSpPr>
+              <p:spPr>
+                <a:xfrm>
+                  <a:off x="9965784" y="3556274"/>
+                  <a:ext cx="1524568" cy="375680"/>
+                </a:xfrm>
+                <a:prstGeom prst="rect">
+                  <a:avLst/>
+                </a:prstGeom>
+                <a:noFill/>
+              </p:spPr>
+              <p:txBody>
+                <a:bodyPr wrap="square" rtlCol="0">
+                  <a:spAutoFit/>
+                </a:bodyPr>
+                <a:lstStyle/>
+                <a:p>
+                  <a14:m>
+                    <m:oMathPara xmlns:m="http://schemas.openxmlformats.org/officeDocument/2006/math">
+                      <m:oMathParaPr>
+                        <m:jc m:val="centerGroup"/>
+                      </m:oMathParaPr>
+                      <m:oMath xmlns:m="http://schemas.openxmlformats.org/officeDocument/2006/math">
+                        <m:sSubSup>
+                          <m:sSubSupPr>
+                            <m:ctrlPr>
+                              <a:rPr lang="en-US" b="0" i="1" smtClean="0">
+                                <a:solidFill>
+                                  <a:srgbClr val="0070C0"/>
+                                </a:solidFill>
+                                <a:latin typeface="Cambria Math" panose="02040503050406030204" pitchFamily="18" charset="0"/>
+                              </a:rPr>
+                            </m:ctrlPr>
+                          </m:sSubSupPr>
+                          <m:e>
+                            <m:r>
+                              <a:rPr lang="en-US" b="0" i="1" smtClean="0">
+                                <a:solidFill>
+                                  <a:srgbClr val="0070C0"/>
+                                </a:solidFill>
+                                <a:latin typeface="Cambria Math" panose="02040503050406030204" pitchFamily="18" charset="0"/>
+                              </a:rPr>
+                              <m:t>𝜑</m:t>
+                            </m:r>
+                          </m:e>
+                          <m:sub>
+                            <m:r>
+                              <a:rPr lang="en-US" b="0" i="1" smtClean="0">
+                                <a:solidFill>
+                                  <a:srgbClr val="0070C0"/>
+                                </a:solidFill>
+                                <a:latin typeface="Cambria Math" panose="02040503050406030204" pitchFamily="18" charset="0"/>
+                              </a:rPr>
+                              <m:t>𝑛</m:t>
+                            </m:r>
+                            <m:r>
+                              <a:rPr lang="en-US" b="0" i="1" smtClean="0">
+                                <a:solidFill>
+                                  <a:srgbClr val="0070C0"/>
+                                </a:solidFill>
+                                <a:latin typeface="Cambria Math" panose="02040503050406030204" pitchFamily="18" charset="0"/>
+                              </a:rPr>
+                              <m:t>+1</m:t>
+                            </m:r>
+                          </m:sub>
+                          <m:sup>
+                            <m:r>
+                              <a:rPr lang="en-US" b="0" i="1" smtClean="0">
+                                <a:solidFill>
+                                  <a:srgbClr val="0070C0"/>
+                                </a:solidFill>
+                                <a:latin typeface="Cambria Math" panose="02040503050406030204" pitchFamily="18" charset="0"/>
+                              </a:rPr>
+                              <m:t>0</m:t>
+                            </m:r>
+                          </m:sup>
+                        </m:sSubSup>
+                        <m:r>
+                          <a:rPr lang="en-US" b="0" i="1" smtClean="0">
+                            <a:solidFill>
+                              <a:srgbClr val="0070C0"/>
+                            </a:solidFill>
+                            <a:latin typeface="Cambria Math" panose="02040503050406030204" pitchFamily="18" charset="0"/>
+                          </a:rPr>
+                          <m:t>=</m:t>
+                        </m:r>
+                        <m:sSub>
+                          <m:sSubPr>
+                            <m:ctrlPr>
+                              <a:rPr lang="en-US" b="0" i="1" smtClean="0">
+                                <a:solidFill>
+                                  <a:srgbClr val="0070C0"/>
+                                </a:solidFill>
+                                <a:latin typeface="Cambria Math" panose="02040503050406030204" pitchFamily="18" charset="0"/>
+                              </a:rPr>
+                            </m:ctrlPr>
+                          </m:sSubPr>
+                          <m:e>
+                            <m:r>
+                              <a:rPr lang="en-US" b="0" i="1" smtClean="0">
+                                <a:solidFill>
+                                  <a:srgbClr val="0070C0"/>
+                                </a:solidFill>
+                                <a:latin typeface="Cambria Math" panose="02040503050406030204" pitchFamily="18" charset="0"/>
+                              </a:rPr>
+                              <m:t>𝜑</m:t>
+                            </m:r>
+                          </m:e>
+                          <m:sub>
+                            <m:r>
+                              <a:rPr lang="en-US" b="0" i="1" smtClean="0">
+                                <a:solidFill>
+                                  <a:srgbClr val="0070C0"/>
+                                </a:solidFill>
+                                <a:latin typeface="Cambria Math" panose="02040503050406030204" pitchFamily="18" charset="0"/>
+                              </a:rPr>
+                              <m:t>𝑛</m:t>
+                            </m:r>
+                          </m:sub>
+                        </m:sSub>
+                      </m:oMath>
+                    </m:oMathPara>
+                  </a14:m>
+                  <a:endParaRPr lang="en-US" dirty="0">
+                    <a:solidFill>
+                      <a:srgbClr val="0070C0"/>
+                    </a:solidFill>
+                  </a:endParaRPr>
+                </a:p>
+              </p:txBody>
+            </p:sp>
+          </mc:Choice>
+          <mc:Fallback>
+            <p:sp>
+              <p:nvSpPr>
+                <p:cNvPr id="60" name="TextBox 59"/>
+                <p:cNvSpPr txBox="1">
+                  <a:spLocks noRot="1" noChangeAspect="1" noMove="1" noResize="1" noEditPoints="1" noAdjustHandles="1" noChangeArrowheads="1" noChangeShapeType="1" noTextEdit="1"/>
+                </p:cNvSpPr>
+                <p:nvPr/>
+              </p:nvSpPr>
+              <p:spPr>
+                <a:xfrm>
+                  <a:off x="9965784" y="3556274"/>
+                  <a:ext cx="1524568" cy="375680"/>
+                </a:xfrm>
+                <a:prstGeom prst="rect">
+                  <a:avLst/>
+                </a:prstGeom>
+                <a:blipFill>
+                  <a:blip r:embed="rId10"/>
+                  <a:stretch>
+                    <a:fillRect b="-6452"/>
+                  </a:stretch>
+                </a:blipFill>
+              </p:spPr>
+              <p:txBody>
+                <a:bodyPr/>
+                <a:lstStyle/>
+                <a:p>
+                  <a:r>
+                    <a:rPr lang="en-US">
+                      <a:noFill/>
+                    </a:rPr>
+                    <a:t> </a:t>
+                  </a:r>
+                </a:p>
+              </p:txBody>
+            </p:sp>
+          </mc:Fallback>
+        </mc:AlternateContent>
+        <mc:AlternateContent xmlns:mc="http://schemas.openxmlformats.org/markup-compatibility/2006">
+          <mc:Choice xmlns:a14="http://schemas.microsoft.com/office/drawing/2010/main" Requires="a14">
+            <p:sp>
+              <p:nvSpPr>
+                <p:cNvPr id="63" name="TextBox 62"/>
+                <p:cNvSpPr txBox="1"/>
+                <p:nvPr/>
+              </p:nvSpPr>
+              <p:spPr>
+                <a:xfrm>
+                  <a:off x="10063611" y="2372198"/>
+                  <a:ext cx="1524568" cy="404983"/>
+                </a:xfrm>
+                <a:prstGeom prst="rect">
+                  <a:avLst/>
+                </a:prstGeom>
+                <a:noFill/>
+              </p:spPr>
+              <p:txBody>
+                <a:bodyPr wrap="square" rtlCol="0">
+                  <a:spAutoFit/>
+                </a:bodyPr>
+                <a:lstStyle/>
+                <a:p>
+                  <a14:m>
+                    <m:oMathPara xmlns:m="http://schemas.openxmlformats.org/officeDocument/2006/math">
+                      <m:oMathParaPr>
+                        <m:jc m:val="centerGroup"/>
+                      </m:oMathParaPr>
+                      <m:oMath xmlns:m="http://schemas.openxmlformats.org/officeDocument/2006/math">
+                        <m:sSubSup>
+                          <m:sSubSupPr>
+                            <m:ctrlPr>
+                              <a:rPr lang="en-US" b="0" i="1" smtClean="0">
+                                <a:solidFill>
+                                  <a:srgbClr val="0070C0"/>
+                                </a:solidFill>
+                                <a:latin typeface="Cambria Math" panose="02040503050406030204" pitchFamily="18" charset="0"/>
+                              </a:rPr>
+                            </m:ctrlPr>
+                          </m:sSubSupPr>
+                          <m:e>
+                            <m:r>
+                              <a:rPr lang="en-US" b="0" i="1" smtClean="0">
+                                <a:solidFill>
+                                  <a:srgbClr val="0070C0"/>
+                                </a:solidFill>
+                                <a:latin typeface="Cambria Math" panose="02040503050406030204" pitchFamily="18" charset="0"/>
+                              </a:rPr>
+                              <m:t>𝜑</m:t>
+                            </m:r>
+                          </m:e>
+                          <m:sub>
+                            <m:r>
+                              <a:rPr lang="en-US" b="0" i="1" smtClean="0">
+                                <a:solidFill>
+                                  <a:srgbClr val="0070C0"/>
+                                </a:solidFill>
+                                <a:latin typeface="Cambria Math" panose="02040503050406030204" pitchFamily="18" charset="0"/>
+                              </a:rPr>
+                              <m:t>𝑛</m:t>
+                            </m:r>
+                            <m:r>
+                              <a:rPr lang="en-US" b="0" i="1" smtClean="0">
+                                <a:solidFill>
+                                  <a:srgbClr val="0070C0"/>
+                                </a:solidFill>
+                                <a:latin typeface="Cambria Math" panose="02040503050406030204" pitchFamily="18" charset="0"/>
+                              </a:rPr>
+                              <m:t>+1</m:t>
+                            </m:r>
+                          </m:sub>
+                          <m:sup>
+                            <m:r>
+                              <a:rPr lang="en-US" b="0" i="1" smtClean="0">
+                                <a:solidFill>
+                                  <a:srgbClr val="0070C0"/>
+                                </a:solidFill>
+                                <a:latin typeface="Cambria Math" panose="02040503050406030204" pitchFamily="18" charset="0"/>
+                              </a:rPr>
+                              <m:t>𝑘</m:t>
+                            </m:r>
+                            <m:r>
+                              <a:rPr lang="en-US" b="0" i="1" smtClean="0">
+                                <a:solidFill>
+                                  <a:srgbClr val="0070C0"/>
+                                </a:solidFill>
+                                <a:latin typeface="Cambria Math" panose="02040503050406030204" pitchFamily="18" charset="0"/>
+                              </a:rPr>
+                              <m:t>+1</m:t>
+                            </m:r>
+                          </m:sup>
+                        </m:sSubSup>
+                        <m:d>
+                          <m:dPr>
+                            <m:ctrlPr>
+                              <a:rPr lang="en-US" b="0" i="1" smtClean="0">
+                                <a:solidFill>
+                                  <a:srgbClr val="0070C0"/>
+                                </a:solidFill>
+                                <a:latin typeface="Cambria Math" panose="02040503050406030204" pitchFamily="18" charset="0"/>
+                              </a:rPr>
+                            </m:ctrlPr>
+                          </m:dPr>
+                          <m:e>
+                            <m:sSubSup>
+                              <m:sSubSupPr>
+                                <m:ctrlPr>
+                                  <a:rPr lang="en-US" b="0" i="1" smtClean="0">
+                                    <a:solidFill>
+                                      <a:srgbClr val="FF0000"/>
+                                    </a:solidFill>
+                                    <a:latin typeface="Cambria Math" panose="02040503050406030204" pitchFamily="18" charset="0"/>
+                                  </a:rPr>
+                                </m:ctrlPr>
+                              </m:sSubSupPr>
+                              <m:e>
+                                <m:r>
+                                  <a:rPr lang="en-US" b="0" i="1" smtClean="0">
+                                    <a:solidFill>
+                                      <a:srgbClr val="FF0000"/>
+                                    </a:solidFill>
+                                    <a:latin typeface="Cambria Math" panose="02040503050406030204" pitchFamily="18" charset="0"/>
+                                  </a:rPr>
+                                  <m:t>𝑝</m:t>
+                                </m:r>
+                              </m:e>
+                              <m:sub>
+                                <m:r>
+                                  <a:rPr lang="en-US" b="0" i="1" smtClean="0">
+                                    <a:solidFill>
+                                      <a:srgbClr val="FF0000"/>
+                                    </a:solidFill>
+                                    <a:latin typeface="Cambria Math" panose="02040503050406030204" pitchFamily="18" charset="0"/>
+                                  </a:rPr>
+                                  <m:t>𝑛</m:t>
+                                </m:r>
+                                <m:r>
+                                  <a:rPr lang="en-US" b="0" i="1" smtClean="0">
+                                    <a:solidFill>
+                                      <a:srgbClr val="FF0000"/>
+                                    </a:solidFill>
+                                    <a:latin typeface="Cambria Math" panose="02040503050406030204" pitchFamily="18" charset="0"/>
+                                  </a:rPr>
+                                  <m:t>+1</m:t>
+                                </m:r>
+                              </m:sub>
+                              <m:sup>
+                                <m:r>
+                                  <a:rPr lang="en-US" b="0" i="1" smtClean="0">
+                                    <a:solidFill>
+                                      <a:srgbClr val="FF0000"/>
+                                    </a:solidFill>
+                                    <a:latin typeface="Cambria Math" panose="02040503050406030204" pitchFamily="18" charset="0"/>
+                                  </a:rPr>
+                                  <m:t>𝑘</m:t>
+                                </m:r>
+                              </m:sup>
+                            </m:sSubSup>
+                            <m:r>
+                              <a:rPr lang="en-US" b="0" i="1" smtClean="0">
+                                <a:solidFill>
+                                  <a:srgbClr val="FF0000"/>
+                                </a:solidFill>
+                                <a:latin typeface="Cambria Math" panose="02040503050406030204" pitchFamily="18" charset="0"/>
+                              </a:rPr>
+                              <m:t> </m:t>
+                            </m:r>
+                          </m:e>
+                        </m:d>
+                      </m:oMath>
+                    </m:oMathPara>
+                  </a14:m>
+                  <a:endParaRPr lang="en-US" dirty="0">
+                    <a:solidFill>
+                      <a:srgbClr val="0070C0"/>
+                    </a:solidFill>
+                  </a:endParaRPr>
+                </a:p>
+              </p:txBody>
+            </p:sp>
+          </mc:Choice>
+          <mc:Fallback>
+            <p:sp>
+              <p:nvSpPr>
+                <p:cNvPr id="63" name="TextBox 62"/>
+                <p:cNvSpPr txBox="1">
+                  <a:spLocks noRot="1" noChangeAspect="1" noMove="1" noResize="1" noEditPoints="1" noAdjustHandles="1" noChangeArrowheads="1" noChangeShapeType="1" noTextEdit="1"/>
+                </p:cNvSpPr>
+                <p:nvPr/>
+              </p:nvSpPr>
+              <p:spPr>
+                <a:xfrm>
+                  <a:off x="10063611" y="2372198"/>
+                  <a:ext cx="1524568" cy="404983"/>
+                </a:xfrm>
+                <a:prstGeom prst="rect">
+                  <a:avLst/>
+                </a:prstGeom>
+                <a:blipFill>
+                  <a:blip r:embed="rId11"/>
+                  <a:stretch>
+                    <a:fillRect b="-3030"/>
+                  </a:stretch>
+                </a:blipFill>
+              </p:spPr>
+              <p:txBody>
+                <a:bodyPr/>
+                <a:lstStyle/>
+                <a:p>
+                  <a:r>
+                    <a:rPr lang="en-US">
+                      <a:noFill/>
+                    </a:rPr>
+                    <a:t> </a:t>
+                  </a:r>
+                </a:p>
+              </p:txBody>
+            </p:sp>
+          </mc:Fallback>
+        </mc:AlternateContent>
+        <mc:AlternateContent xmlns:mc="http://schemas.openxmlformats.org/markup-compatibility/2006">
+          <mc:Choice xmlns:a14="http://schemas.microsoft.com/office/drawing/2010/main" Requires="a14">
+            <p:sp>
+              <p:nvSpPr>
+                <p:cNvPr id="64" name="Rectangle 63"/>
+                <p:cNvSpPr/>
+                <p:nvPr/>
+              </p:nvSpPr>
+              <p:spPr>
+                <a:xfrm>
+                  <a:off x="11209802" y="4050329"/>
+                  <a:ext cx="334579" cy="369332"/>
+                </a:xfrm>
+                <a:prstGeom prst="rect">
+                  <a:avLst/>
+                </a:prstGeom>
+              </p:spPr>
+              <p:txBody>
+                <a:bodyPr wrap="none">
+                  <a:spAutoFit/>
+                </a:bodyPr>
+                <a:lstStyle/>
+                <a:p>
+                  <a14:m>
+                    <m:oMathPara xmlns:m="http://schemas.openxmlformats.org/officeDocument/2006/math">
+                      <m:oMathParaPr>
+                        <m:jc m:val="centerGroup"/>
+                      </m:oMathParaPr>
+                      <m:oMath xmlns:m="http://schemas.openxmlformats.org/officeDocument/2006/math">
+                        <m:r>
+                          <a:rPr lang="en-US" i="1">
+                            <a:latin typeface="Cambria Math" panose="02040503050406030204" pitchFamily="18" charset="0"/>
+                          </a:rPr>
+                          <m:t>𝑡</m:t>
+                        </m:r>
+                      </m:oMath>
+                    </m:oMathPara>
+                  </a14:m>
+                  <a:endParaRPr lang="en-US" dirty="0"/>
+                </a:p>
+              </p:txBody>
+            </p:sp>
+          </mc:Choice>
+          <mc:Fallback>
+            <p:sp>
+              <p:nvSpPr>
+                <p:cNvPr id="64" name="Rectangle 63"/>
+                <p:cNvSpPr>
+                  <a:spLocks noRot="1" noChangeAspect="1" noMove="1" noResize="1" noEditPoints="1" noAdjustHandles="1" noChangeArrowheads="1" noChangeShapeType="1" noTextEdit="1"/>
+                </p:cNvSpPr>
+                <p:nvPr/>
+              </p:nvSpPr>
+              <p:spPr>
+                <a:xfrm>
+                  <a:off x="11209802" y="4050329"/>
+                  <a:ext cx="334579" cy="369332"/>
+                </a:xfrm>
+                <a:prstGeom prst="rect">
+                  <a:avLst/>
+                </a:prstGeom>
+                <a:blipFill>
+                  <a:blip r:embed="rId12"/>
+                  <a:stretch>
+                    <a:fillRect/>
+                  </a:stretch>
+                </a:blipFill>
+              </p:spPr>
+              <p:txBody>
+                <a:bodyPr/>
+                <a:lstStyle/>
+                <a:p>
+                  <a:r>
+                    <a:rPr lang="en-US">
+                      <a:noFill/>
+                    </a:rPr>
+                    <a:t> </a:t>
+                  </a:r>
+                </a:p>
+              </p:txBody>
+            </p:sp>
+          </mc:Fallback>
+        </mc:AlternateContent>
+        <mc:AlternateContent xmlns:mc="http://schemas.openxmlformats.org/markup-compatibility/2006">
+          <mc:Choice xmlns:a14="http://schemas.microsoft.com/office/drawing/2010/main" Requires="a14">
+            <p:sp>
+              <p:nvSpPr>
+                <p:cNvPr id="65" name="Rectangle 64"/>
+                <p:cNvSpPr/>
+                <p:nvPr/>
+              </p:nvSpPr>
+              <p:spPr>
+                <a:xfrm>
+                  <a:off x="9485270" y="4239127"/>
+                  <a:ext cx="703461" cy="369332"/>
+                </a:xfrm>
+                <a:prstGeom prst="rect">
+                  <a:avLst/>
+                </a:prstGeom>
+              </p:spPr>
+              <p:txBody>
+                <a:bodyPr wrap="none">
+                  <a:spAutoFit/>
+                </a:bodyPr>
+                <a:lstStyle/>
+                <a:p>
+                  <a14:m>
+                    <m:oMathPara xmlns:m="http://schemas.openxmlformats.org/officeDocument/2006/math">
+                      <m:oMathParaPr>
+                        <m:jc m:val="centerGroup"/>
+                      </m:oMathParaPr>
+                      <m:oMath xmlns:m="http://schemas.openxmlformats.org/officeDocument/2006/math">
+                        <m:sSub>
+                          <m:sSubPr>
+                            <m:ctrlPr>
+                              <a:rPr lang="en-US" b="0" i="1" smtClean="0">
+                                <a:latin typeface="Cambria Math" panose="02040503050406030204" pitchFamily="18" charset="0"/>
+                              </a:rPr>
+                            </m:ctrlPr>
+                          </m:sSubPr>
+                          <m:e>
+                            <m:r>
+                              <a:rPr lang="en-US" i="1" smtClean="0">
+                                <a:latin typeface="Cambria Math" panose="02040503050406030204" pitchFamily="18" charset="0"/>
+                              </a:rPr>
+                              <m:t>𝑡</m:t>
+                            </m:r>
+                          </m:e>
+                          <m:sub>
+                            <m:r>
+                              <a:rPr lang="en-US" b="0" i="1" smtClean="0">
+                                <a:latin typeface="Cambria Math" panose="02040503050406030204" pitchFamily="18" charset="0"/>
+                              </a:rPr>
+                              <m:t>𝑛</m:t>
+                            </m:r>
+                            <m:r>
+                              <a:rPr lang="en-US" b="0" i="1" smtClean="0">
+                                <a:latin typeface="Cambria Math" panose="02040503050406030204" pitchFamily="18" charset="0"/>
+                              </a:rPr>
+                              <m:t>+1 </m:t>
+                            </m:r>
+                          </m:sub>
+                        </m:sSub>
+                      </m:oMath>
+                    </m:oMathPara>
+                  </a14:m>
+                  <a:endParaRPr lang="en-US" dirty="0"/>
+                </a:p>
+              </p:txBody>
+            </p:sp>
+          </mc:Choice>
+          <mc:Fallback>
+            <p:sp>
+              <p:nvSpPr>
+                <p:cNvPr id="65" name="Rectangle 64"/>
+                <p:cNvSpPr>
+                  <a:spLocks noRot="1" noChangeAspect="1" noMove="1" noResize="1" noEditPoints="1" noAdjustHandles="1" noChangeArrowheads="1" noChangeShapeType="1" noTextEdit="1"/>
+                </p:cNvSpPr>
+                <p:nvPr/>
+              </p:nvSpPr>
+              <p:spPr>
+                <a:xfrm>
+                  <a:off x="9485270" y="4239127"/>
+                  <a:ext cx="703461" cy="369332"/>
+                </a:xfrm>
+                <a:prstGeom prst="rect">
+                  <a:avLst/>
+                </a:prstGeom>
+                <a:blipFill>
+                  <a:blip r:embed="rId13"/>
+                  <a:stretch>
+                    <a:fillRect/>
+                  </a:stretch>
+                </a:blipFill>
+              </p:spPr>
+              <p:txBody>
+                <a:bodyPr/>
+                <a:lstStyle/>
+                <a:p>
+                  <a:r>
+                    <a:rPr lang="en-US">
+                      <a:noFill/>
+                    </a:rPr>
+                    <a:t> </a:t>
+                  </a:r>
+                </a:p>
+              </p:txBody>
+            </p:sp>
+          </mc:Fallback>
+        </mc:AlternateContent>
+        <mc:AlternateContent xmlns:mc="http://schemas.openxmlformats.org/markup-compatibility/2006">
+          <mc:Choice xmlns:a14="http://schemas.microsoft.com/office/drawing/2010/main" Requires="a14">
+            <p:sp>
+              <p:nvSpPr>
+                <p:cNvPr id="66" name="Rectangle 65"/>
+                <p:cNvSpPr/>
+                <p:nvPr/>
+              </p:nvSpPr>
+              <p:spPr>
+                <a:xfrm>
+                  <a:off x="1686931" y="4205192"/>
+                  <a:ext cx="483850" cy="369332"/>
+                </a:xfrm>
+                <a:prstGeom prst="rect">
+                  <a:avLst/>
+                </a:prstGeom>
+              </p:spPr>
+              <p:txBody>
+                <a:bodyPr wrap="none">
+                  <a:spAutoFit/>
+                </a:bodyPr>
+                <a:lstStyle/>
+                <a:p>
+                  <a14:m>
+                    <m:oMathPara xmlns:m="http://schemas.openxmlformats.org/officeDocument/2006/math">
+                      <m:oMathParaPr>
+                        <m:jc m:val="centerGroup"/>
+                      </m:oMathParaPr>
+                      <m:oMath xmlns:m="http://schemas.openxmlformats.org/officeDocument/2006/math">
+                        <m:sSub>
+                          <m:sSubPr>
+                            <m:ctrlPr>
+                              <a:rPr lang="en-US" b="0" i="1" smtClean="0">
+                                <a:latin typeface="Cambria Math" panose="02040503050406030204" pitchFamily="18" charset="0"/>
+                              </a:rPr>
+                            </m:ctrlPr>
+                          </m:sSubPr>
+                          <m:e>
+                            <m:r>
+                              <a:rPr lang="en-US" i="1" smtClean="0">
+                                <a:latin typeface="Cambria Math" panose="02040503050406030204" pitchFamily="18" charset="0"/>
+                              </a:rPr>
+                              <m:t>𝑡</m:t>
+                            </m:r>
+                          </m:e>
+                          <m:sub>
+                            <m:r>
+                              <a:rPr lang="en-US" b="0" i="1" smtClean="0">
+                                <a:latin typeface="Cambria Math" panose="02040503050406030204" pitchFamily="18" charset="0"/>
+                              </a:rPr>
+                              <m:t>𝑛</m:t>
+                            </m:r>
+                            <m:r>
+                              <a:rPr lang="en-US" b="0" i="1" smtClean="0">
+                                <a:latin typeface="Cambria Math" panose="02040503050406030204" pitchFamily="18" charset="0"/>
+                              </a:rPr>
+                              <m:t> </m:t>
+                            </m:r>
+                          </m:sub>
+                        </m:sSub>
+                      </m:oMath>
+                    </m:oMathPara>
+                  </a14:m>
+                  <a:endParaRPr lang="en-US" dirty="0"/>
+                </a:p>
+              </p:txBody>
+            </p:sp>
+          </mc:Choice>
+          <mc:Fallback>
+            <p:sp>
+              <p:nvSpPr>
+                <p:cNvPr id="66" name="Rectangle 65"/>
+                <p:cNvSpPr>
+                  <a:spLocks noRot="1" noChangeAspect="1" noMove="1" noResize="1" noEditPoints="1" noAdjustHandles="1" noChangeArrowheads="1" noChangeShapeType="1" noTextEdit="1"/>
+                </p:cNvSpPr>
+                <p:nvPr/>
+              </p:nvSpPr>
+              <p:spPr>
+                <a:xfrm>
+                  <a:off x="1686931" y="4205192"/>
+                  <a:ext cx="483850" cy="369332"/>
+                </a:xfrm>
+                <a:prstGeom prst="rect">
+                  <a:avLst/>
+                </a:prstGeom>
+                <a:blipFill>
+                  <a:blip r:embed="rId14"/>
+                  <a:stretch>
+                    <a:fillRect/>
+                  </a:stretch>
+                </a:blipFill>
+              </p:spPr>
+              <p:txBody>
+                <a:bodyPr/>
+                <a:lstStyle/>
+                <a:p>
+                  <a:r>
+                    <a:rPr lang="en-US">
+                      <a:noFill/>
+                    </a:rPr>
+                    <a:t> </a:t>
+                  </a:r>
+                </a:p>
+              </p:txBody>
+            </p:sp>
+          </mc:Fallback>
+        </mc:AlternateContent>
+      </p:grpSp>
+    </p:spTree>
+    <p:extLst>
+      <p:ext uri="{BB962C8B-B14F-4D97-AF65-F5344CB8AC3E}">
+        <p14:creationId xmlns:p14="http://schemas.microsoft.com/office/powerpoint/2010/main" val="1377793327"/>
+      </p:ext>
+    </p:extLst>
+  </p:cSld>
+  <p:clrMapOvr>
+    <a:masterClrMapping/>
+  </p:clrMapOvr>
+</p:sld>
+</file>
+
+<file path=ppt/slides/slide4.xml><?xml version="1.0" encoding="utf-8"?>
+<p:sld xmlns:a="http://schemas.openxmlformats.org/drawingml/2006/main" xmlns:r="http://schemas.openxmlformats.org/officeDocument/2006/relationships" xmlns:p="http://schemas.openxmlformats.org/presentationml/2006/main">
+  <p:cSld>
+    <p:spTree>
+      <p:nvGrpSpPr>
+        <p:cNvPr id="1" name=""/>
+        <p:cNvGrpSpPr/>
+        <p:nvPr/>
+      </p:nvGrpSpPr>
+      <p:grpSpPr>
+        <a:xfrm>
+          <a:off x="0" y="0"/>
+          <a:ext cx="0" cy="0"/>
+          <a:chOff x="0" y="0"/>
+          <a:chExt cx="0" cy="0"/>
+        </a:xfrm>
+      </p:grpSpPr>
+      <p:grpSp>
+        <p:nvGrpSpPr>
           <p:cNvPr id="47" name="Group 46"/>
           <p:cNvGrpSpPr/>
           <p:nvPr/>
@@ -5502,7 +8713,7 @@
 </p:sld>
 </file>
 
-<file path=ppt/slides/slide4.xml><?xml version="1.0" encoding="utf-8"?>
+<file path=ppt/slides/slide5.xml><?xml version="1.0" encoding="utf-8"?>
 <p:sld xmlns:a="http://schemas.openxmlformats.org/drawingml/2006/main" xmlns:r="http://schemas.openxmlformats.org/officeDocument/2006/relationships" xmlns:p="http://schemas.openxmlformats.org/presentationml/2006/main">
   <p:cSld>
     <p:spTree>
@@ -6328,7 +9539,7 @@
 </p:sld>
 </file>
 
-<file path=ppt/slides/slide5.xml><?xml version="1.0" encoding="utf-8"?>
+<file path=ppt/slides/slide6.xml><?xml version="1.0" encoding="utf-8"?>
 <p:sld xmlns:a="http://schemas.openxmlformats.org/drawingml/2006/main" xmlns:r="http://schemas.openxmlformats.org/officeDocument/2006/relationships" xmlns:p="http://schemas.openxmlformats.org/presentationml/2006/main">
   <p:cSld>
     <p:spTree>

</xml_diff>